<commit_message>
draft code for all principles
</commit_message>
<xml_diff>
--- a/SOLID.pptx
+++ b/SOLID.pptx
@@ -15,9 +15,9 @@
     <p:sldId id="256" r:id="rId6"/>
     <p:sldId id="257" r:id="rId7"/>
     <p:sldId id="260" r:id="rId8"/>
-    <p:sldId id="264" r:id="rId9"/>
-    <p:sldId id="258" r:id="rId10"/>
-    <p:sldId id="261" r:id="rId11"/>
+    <p:sldId id="258" r:id="rId9"/>
+    <p:sldId id="261" r:id="rId10"/>
+    <p:sldId id="265" r:id="rId11"/>
     <p:sldId id="262" r:id="rId12"/>
     <p:sldId id="263" r:id="rId13"/>
     <p:sldId id="259" r:id="rId14"/>
@@ -425,6 +425,440 @@
     </pc:docChg>
   </pc:docChgLst>
   <pc:docChgLst>
+    <pc:chgData name="Peter Chen (he/him/his)" userId="b2ddb297-e149-4638-9e0d-b08ac0c0453d" providerId="ADAL" clId="{1A40F780-8006-42FA-9CE1-26CA9D2C83AA}"/>
+    <pc:docChg chg="modMainMaster">
+      <pc:chgData name="Peter Chen (he/him/his)" userId="b2ddb297-e149-4638-9e0d-b08ac0c0453d" providerId="ADAL" clId="{1A40F780-8006-42FA-9CE1-26CA9D2C83AA}" dt="2022-05-24T21:18:39.554" v="7" actId="22"/>
+      <pc:docMkLst>
+        <pc:docMk/>
+      </pc:docMkLst>
+      <pc:sldMasterChg chg="modSldLayout">
+        <pc:chgData name="Peter Chen (he/him/his)" userId="b2ddb297-e149-4638-9e0d-b08ac0c0453d" providerId="ADAL" clId="{1A40F780-8006-42FA-9CE1-26CA9D2C83AA}" dt="2022-05-24T21:18:39.554" v="7" actId="22"/>
+        <pc:sldMasterMkLst>
+          <pc:docMk/>
+          <pc:sldMasterMk cId="1881724970" sldId="2147484551"/>
+        </pc:sldMasterMkLst>
+        <pc:sldLayoutChg chg="addSp mod">
+          <pc:chgData name="Peter Chen (he/him/his)" userId="b2ddb297-e149-4638-9e0d-b08ac0c0453d" providerId="ADAL" clId="{1A40F780-8006-42FA-9CE1-26CA9D2C83AA}" dt="2022-05-24T21:18:39.554" v="7" actId="22"/>
+          <pc:sldLayoutMkLst>
+            <pc:docMk/>
+            <pc:sldMasterMk cId="1881724970" sldId="2147484551"/>
+            <pc:sldLayoutMk cId="3569326217" sldId="2147484568"/>
+          </pc:sldLayoutMkLst>
+          <pc:picChg chg="add">
+            <ac:chgData name="Peter Chen (he/him/his)" userId="b2ddb297-e149-4638-9e0d-b08ac0c0453d" providerId="ADAL" clId="{1A40F780-8006-42FA-9CE1-26CA9D2C83AA}" dt="2022-05-24T21:18:39.554" v="7" actId="22"/>
+            <ac:picMkLst>
+              <pc:docMk/>
+              <pc:sldMasterMk cId="1881724970" sldId="2147484551"/>
+              <pc:sldLayoutMk cId="3569326217" sldId="2147484568"/>
+              <ac:picMk id="3" creationId="{230F1609-C5AA-81F4-37E1-D6FA129E99A4}"/>
+            </ac:picMkLst>
+          </pc:picChg>
+        </pc:sldLayoutChg>
+        <pc:sldLayoutChg chg="addSp mod">
+          <pc:chgData name="Peter Chen (he/him/his)" userId="b2ddb297-e149-4638-9e0d-b08ac0c0453d" providerId="ADAL" clId="{1A40F780-8006-42FA-9CE1-26CA9D2C83AA}" dt="2022-05-24T21:18:20.115" v="0" actId="22"/>
+          <pc:sldLayoutMkLst>
+            <pc:docMk/>
+            <pc:sldMasterMk cId="1881724970" sldId="2147484551"/>
+            <pc:sldLayoutMk cId="3820680019" sldId="2147484586"/>
+          </pc:sldLayoutMkLst>
+          <pc:picChg chg="add">
+            <ac:chgData name="Peter Chen (he/him/his)" userId="b2ddb297-e149-4638-9e0d-b08ac0c0453d" providerId="ADAL" clId="{1A40F780-8006-42FA-9CE1-26CA9D2C83AA}" dt="2022-05-24T21:18:20.115" v="0" actId="22"/>
+            <ac:picMkLst>
+              <pc:docMk/>
+              <pc:sldMasterMk cId="1881724970" sldId="2147484551"/>
+              <pc:sldLayoutMk cId="3820680019" sldId="2147484586"/>
+              <ac:picMk id="2" creationId="{1061C88F-28CE-D606-8069-B66E7D3AB706}"/>
+            </ac:picMkLst>
+          </pc:picChg>
+        </pc:sldLayoutChg>
+        <pc:sldLayoutChg chg="addSp mod">
+          <pc:chgData name="Peter Chen (he/him/his)" userId="b2ddb297-e149-4638-9e0d-b08ac0c0453d" providerId="ADAL" clId="{1A40F780-8006-42FA-9CE1-26CA9D2C83AA}" dt="2022-05-24T21:18:26.555" v="1" actId="22"/>
+          <pc:sldLayoutMkLst>
+            <pc:docMk/>
+            <pc:sldMasterMk cId="1881724970" sldId="2147484551"/>
+            <pc:sldLayoutMk cId="83484138" sldId="2147484611"/>
+          </pc:sldLayoutMkLst>
+          <pc:picChg chg="add">
+            <ac:chgData name="Peter Chen (he/him/his)" userId="b2ddb297-e149-4638-9e0d-b08ac0c0453d" providerId="ADAL" clId="{1A40F780-8006-42FA-9CE1-26CA9D2C83AA}" dt="2022-05-24T21:18:26.555" v="1" actId="22"/>
+            <ac:picMkLst>
+              <pc:docMk/>
+              <pc:sldMasterMk cId="1881724970" sldId="2147484551"/>
+              <pc:sldLayoutMk cId="83484138" sldId="2147484611"/>
+              <ac:picMk id="4" creationId="{B815F539-844E-18E8-D33D-376A98B08D72}"/>
+            </ac:picMkLst>
+          </pc:picChg>
+        </pc:sldLayoutChg>
+        <pc:sldLayoutChg chg="addSp mod">
+          <pc:chgData name="Peter Chen (he/him/his)" userId="b2ddb297-e149-4638-9e0d-b08ac0c0453d" providerId="ADAL" clId="{1A40F780-8006-42FA-9CE1-26CA9D2C83AA}" dt="2022-05-24T21:18:29.236" v="2" actId="22"/>
+          <pc:sldLayoutMkLst>
+            <pc:docMk/>
+            <pc:sldMasterMk cId="1881724970" sldId="2147484551"/>
+            <pc:sldLayoutMk cId="1090860398" sldId="2147484612"/>
+          </pc:sldLayoutMkLst>
+          <pc:picChg chg="add">
+            <ac:chgData name="Peter Chen (he/him/his)" userId="b2ddb297-e149-4638-9e0d-b08ac0c0453d" providerId="ADAL" clId="{1A40F780-8006-42FA-9CE1-26CA9D2C83AA}" dt="2022-05-24T21:18:29.236" v="2" actId="22"/>
+            <ac:picMkLst>
+              <pc:docMk/>
+              <pc:sldMasterMk cId="1881724970" sldId="2147484551"/>
+              <pc:sldLayoutMk cId="1090860398" sldId="2147484612"/>
+              <ac:picMk id="3" creationId="{537D3E27-5C82-0B19-6B67-62EC116F2A6D}"/>
+            </ac:picMkLst>
+          </pc:picChg>
+        </pc:sldLayoutChg>
+        <pc:sldLayoutChg chg="addSp mod">
+          <pc:chgData name="Peter Chen (he/him/his)" userId="b2ddb297-e149-4638-9e0d-b08ac0c0453d" providerId="ADAL" clId="{1A40F780-8006-42FA-9CE1-26CA9D2C83AA}" dt="2022-05-24T21:18:35.900" v="5" actId="22"/>
+          <pc:sldLayoutMkLst>
+            <pc:docMk/>
+            <pc:sldMasterMk cId="1881724970" sldId="2147484551"/>
+            <pc:sldLayoutMk cId="3206052122" sldId="2147484613"/>
+          </pc:sldLayoutMkLst>
+          <pc:picChg chg="add">
+            <ac:chgData name="Peter Chen (he/him/his)" userId="b2ddb297-e149-4638-9e0d-b08ac0c0453d" providerId="ADAL" clId="{1A40F780-8006-42FA-9CE1-26CA9D2C83AA}" dt="2022-05-24T21:18:35.900" v="5" actId="22"/>
+            <ac:picMkLst>
+              <pc:docMk/>
+              <pc:sldMasterMk cId="1881724970" sldId="2147484551"/>
+              <pc:sldLayoutMk cId="3206052122" sldId="2147484613"/>
+              <ac:picMk id="3" creationId="{015F68C3-13B8-6115-8583-0A79BB69844E}"/>
+            </ac:picMkLst>
+          </pc:picChg>
+        </pc:sldLayoutChg>
+        <pc:sldLayoutChg chg="addSp mod">
+          <pc:chgData name="Peter Chen (he/him/his)" userId="b2ddb297-e149-4638-9e0d-b08ac0c0453d" providerId="ADAL" clId="{1A40F780-8006-42FA-9CE1-26CA9D2C83AA}" dt="2022-05-24T21:18:32.665" v="3" actId="22"/>
+          <pc:sldLayoutMkLst>
+            <pc:docMk/>
+            <pc:sldMasterMk cId="1881724970" sldId="2147484551"/>
+            <pc:sldLayoutMk cId="1951571362" sldId="2147484615"/>
+          </pc:sldLayoutMkLst>
+          <pc:picChg chg="add">
+            <ac:chgData name="Peter Chen (he/him/his)" userId="b2ddb297-e149-4638-9e0d-b08ac0c0453d" providerId="ADAL" clId="{1A40F780-8006-42FA-9CE1-26CA9D2C83AA}" dt="2022-05-24T21:18:32.665" v="3" actId="22"/>
+            <ac:picMkLst>
+              <pc:docMk/>
+              <pc:sldMasterMk cId="1881724970" sldId="2147484551"/>
+              <pc:sldLayoutMk cId="1951571362" sldId="2147484615"/>
+              <ac:picMk id="3" creationId="{11AFFDDB-D23A-DF33-7AC2-5627B1917C9B}"/>
+            </ac:picMkLst>
+          </pc:picChg>
+        </pc:sldLayoutChg>
+        <pc:sldLayoutChg chg="addSp mod">
+          <pc:chgData name="Peter Chen (he/him/his)" userId="b2ddb297-e149-4638-9e0d-b08ac0c0453d" providerId="ADAL" clId="{1A40F780-8006-42FA-9CE1-26CA9D2C83AA}" dt="2022-05-24T21:18:34.314" v="4" actId="22"/>
+          <pc:sldLayoutMkLst>
+            <pc:docMk/>
+            <pc:sldMasterMk cId="1881724970" sldId="2147484551"/>
+            <pc:sldLayoutMk cId="2992215150" sldId="2147484616"/>
+          </pc:sldLayoutMkLst>
+          <pc:picChg chg="add">
+            <ac:chgData name="Peter Chen (he/him/his)" userId="b2ddb297-e149-4638-9e0d-b08ac0c0453d" providerId="ADAL" clId="{1A40F780-8006-42FA-9CE1-26CA9D2C83AA}" dt="2022-05-24T21:18:34.314" v="4" actId="22"/>
+            <ac:picMkLst>
+              <pc:docMk/>
+              <pc:sldMasterMk cId="1881724970" sldId="2147484551"/>
+              <pc:sldLayoutMk cId="2992215150" sldId="2147484616"/>
+              <ac:picMk id="3" creationId="{BDEC1A94-B678-7B9C-2479-C8E4BB1477CC}"/>
+            </ac:picMkLst>
+          </pc:picChg>
+        </pc:sldLayoutChg>
+        <pc:sldLayoutChg chg="addSp mod">
+          <pc:chgData name="Peter Chen (he/him/his)" userId="b2ddb297-e149-4638-9e0d-b08ac0c0453d" providerId="ADAL" clId="{1A40F780-8006-42FA-9CE1-26CA9D2C83AA}" dt="2022-05-24T21:18:37.727" v="6" actId="22"/>
+          <pc:sldLayoutMkLst>
+            <pc:docMk/>
+            <pc:sldMasterMk cId="1881724970" sldId="2147484551"/>
+            <pc:sldLayoutMk cId="3954081687" sldId="2147484617"/>
+          </pc:sldLayoutMkLst>
+          <pc:picChg chg="add">
+            <ac:chgData name="Peter Chen (he/him/his)" userId="b2ddb297-e149-4638-9e0d-b08ac0c0453d" providerId="ADAL" clId="{1A40F780-8006-42FA-9CE1-26CA9D2C83AA}" dt="2022-05-24T21:18:37.727" v="6" actId="22"/>
+            <ac:picMkLst>
+              <pc:docMk/>
+              <pc:sldMasterMk cId="1881724970" sldId="2147484551"/>
+              <pc:sldLayoutMk cId="3954081687" sldId="2147484617"/>
+              <ac:picMk id="2" creationId="{FA153C55-4C0C-9EBB-3E8C-CE9B4158E029}"/>
+            </ac:picMkLst>
+          </pc:picChg>
+        </pc:sldLayoutChg>
+      </pc:sldMasterChg>
+    </pc:docChg>
+  </pc:docChgLst>
+  <pc:docChgLst>
+    <pc:chgData name="David Starr" userId="6ddbe242-7791-472e-b298-418493ddd580" providerId="ADAL" clId="{1DD82897-10CD-4B31-9576-69908EC684FA}"/>
+    <pc:docChg chg="undo redo custSel addSld modSld sldOrd">
+      <pc:chgData name="David Starr" userId="6ddbe242-7791-472e-b298-418493ddd580" providerId="ADAL" clId="{1DD82897-10CD-4B31-9576-69908EC684FA}" dt="2023-01-11T21:25:43.696" v="359" actId="20577"/>
+      <pc:docMkLst>
+        <pc:docMk/>
+      </pc:docMkLst>
+      <pc:sldChg chg="modSp mod">
+        <pc:chgData name="David Starr" userId="6ddbe242-7791-472e-b298-418493ddd580" providerId="ADAL" clId="{1DD82897-10CD-4B31-9576-69908EC684FA}" dt="2023-01-11T19:42:11.803" v="72" actId="20577"/>
+        <pc:sldMkLst>
+          <pc:docMk/>
+          <pc:sldMk cId="2580197328" sldId="256"/>
+        </pc:sldMkLst>
+        <pc:spChg chg="mod">
+          <ac:chgData name="David Starr" userId="6ddbe242-7791-472e-b298-418493ddd580" providerId="ADAL" clId="{1DD82897-10CD-4B31-9576-69908EC684FA}" dt="2023-01-11T19:41:56.643" v="41" actId="20577"/>
+          <ac:spMkLst>
+            <pc:docMk/>
+            <pc:sldMk cId="2580197328" sldId="256"/>
+            <ac:spMk id="2" creationId="{DA5405D5-CF41-7457-4892-4D86FF283021}"/>
+          </ac:spMkLst>
+        </pc:spChg>
+        <pc:spChg chg="mod">
+          <ac:chgData name="David Starr" userId="6ddbe242-7791-472e-b298-418493ddd580" providerId="ADAL" clId="{1DD82897-10CD-4B31-9576-69908EC684FA}" dt="2023-01-11T19:42:11.803" v="72" actId="20577"/>
+          <ac:spMkLst>
+            <pc:docMk/>
+            <pc:sldMk cId="2580197328" sldId="256"/>
+            <ac:spMk id="3" creationId="{0800C02F-8D61-6517-31E4-D9126BB0981B}"/>
+          </ac:spMkLst>
+        </pc:spChg>
+      </pc:sldChg>
+      <pc:sldChg chg="addSp delSp modSp mod modClrScheme modAnim chgLayout">
+        <pc:chgData name="David Starr" userId="6ddbe242-7791-472e-b298-418493ddd580" providerId="ADAL" clId="{1DD82897-10CD-4B31-9576-69908EC684FA}" dt="2023-01-11T21:23:36.321" v="295" actId="1076"/>
+        <pc:sldMkLst>
+          <pc:docMk/>
+          <pc:sldMk cId="1836972722" sldId="257"/>
+        </pc:sldMkLst>
+        <pc:spChg chg="del mod ord">
+          <ac:chgData name="David Starr" userId="6ddbe242-7791-472e-b298-418493ddd580" providerId="ADAL" clId="{1DD82897-10CD-4B31-9576-69908EC684FA}" dt="2023-01-11T21:10:51.935" v="73" actId="700"/>
+          <ac:spMkLst>
+            <pc:docMk/>
+            <pc:sldMk cId="1836972722" sldId="257"/>
+            <ac:spMk id="2" creationId="{B0D68870-F9D5-4827-1E9F-6A80A7E5D219}"/>
+          </ac:spMkLst>
+        </pc:spChg>
+        <pc:spChg chg="del mod ord">
+          <ac:chgData name="David Starr" userId="6ddbe242-7791-472e-b298-418493ddd580" providerId="ADAL" clId="{1DD82897-10CD-4B31-9576-69908EC684FA}" dt="2023-01-11T21:10:51.935" v="73" actId="700"/>
+          <ac:spMkLst>
+            <pc:docMk/>
+            <pc:sldMk cId="1836972722" sldId="257"/>
+            <ac:spMk id="3" creationId="{13AD9785-CE58-C194-797B-40E60223A6B4}"/>
+          </ac:spMkLst>
+        </pc:spChg>
+        <pc:spChg chg="add mod ord">
+          <ac:chgData name="David Starr" userId="6ddbe242-7791-472e-b298-418493ddd580" providerId="ADAL" clId="{1DD82897-10CD-4B31-9576-69908EC684FA}" dt="2023-01-11T21:23:36.321" v="295" actId="1076"/>
+          <ac:spMkLst>
+            <pc:docMk/>
+            <pc:sldMk cId="1836972722" sldId="257"/>
+            <ac:spMk id="4" creationId="{146F4643-71A0-2321-FCE0-9CA534BA0075}"/>
+          </ac:spMkLst>
+        </pc:spChg>
+        <pc:spChg chg="add mod ord">
+          <ac:chgData name="David Starr" userId="6ddbe242-7791-472e-b298-418493ddd580" providerId="ADAL" clId="{1DD82897-10CD-4B31-9576-69908EC684FA}" dt="2023-01-11T21:23:36.321" v="295" actId="1076"/>
+          <ac:spMkLst>
+            <pc:docMk/>
+            <pc:sldMk cId="1836972722" sldId="257"/>
+            <ac:spMk id="5" creationId="{730A7CCF-3703-E73E-B6BA-811FE4ACF1FD}"/>
+          </ac:spMkLst>
+        </pc:spChg>
+        <pc:spChg chg="add del mod ord">
+          <ac:chgData name="David Starr" userId="6ddbe242-7791-472e-b298-418493ddd580" providerId="ADAL" clId="{1DD82897-10CD-4B31-9576-69908EC684FA}" dt="2023-01-11T21:16:58.034" v="242" actId="931"/>
+          <ac:spMkLst>
+            <pc:docMk/>
+            <pc:sldMk cId="1836972722" sldId="257"/>
+            <ac:spMk id="6" creationId="{497DAFDA-8DB3-3ED5-F667-B6C06C59F1D4}"/>
+          </ac:spMkLst>
+        </pc:spChg>
+        <pc:spChg chg="add mod">
+          <ac:chgData name="David Starr" userId="6ddbe242-7791-472e-b298-418493ddd580" providerId="ADAL" clId="{1DD82897-10CD-4B31-9576-69908EC684FA}" dt="2023-01-11T21:17:06.612" v="246" actId="14100"/>
+          <ac:spMkLst>
+            <pc:docMk/>
+            <pc:sldMk cId="1836972722" sldId="257"/>
+            <ac:spMk id="9" creationId="{4FB2E3F7-9519-38CF-3962-84663F133F61}"/>
+          </ac:spMkLst>
+        </pc:spChg>
+        <pc:spChg chg="add del">
+          <ac:chgData name="David Starr" userId="6ddbe242-7791-472e-b298-418493ddd580" providerId="ADAL" clId="{1DD82897-10CD-4B31-9576-69908EC684FA}" dt="2023-01-11T21:17:54.755" v="250" actId="478"/>
+          <ac:spMkLst>
+            <pc:docMk/>
+            <pc:sldMk cId="1836972722" sldId="257"/>
+            <ac:spMk id="11" creationId="{EA3594FA-BA35-674F-BD65-FFB8B97832E8}"/>
+          </ac:spMkLst>
+        </pc:spChg>
+        <pc:picChg chg="add mod ord">
+          <ac:chgData name="David Starr" userId="6ddbe242-7791-472e-b298-418493ddd580" providerId="ADAL" clId="{1DD82897-10CD-4B31-9576-69908EC684FA}" dt="2023-01-11T21:23:20.762" v="294" actId="1076"/>
+          <ac:picMkLst>
+            <pc:docMk/>
+            <pc:sldMk cId="1836972722" sldId="257"/>
+            <ac:picMk id="8" creationId="{1993F7BF-72E6-0CFD-E06D-3978DD1E28B6}"/>
+          </ac:picMkLst>
+        </pc:picChg>
+        <pc:picChg chg="add mod">
+          <ac:chgData name="David Starr" userId="6ddbe242-7791-472e-b298-418493ddd580" providerId="ADAL" clId="{1DD82897-10CD-4B31-9576-69908EC684FA}" dt="2023-01-11T21:23:05.846" v="291" actId="1076"/>
+          <ac:picMkLst>
+            <pc:docMk/>
+            <pc:sldMk cId="1836972722" sldId="257"/>
+            <ac:picMk id="1026" creationId="{ED7A942C-7B59-0789-817C-B34411368A90}"/>
+          </ac:picMkLst>
+        </pc:picChg>
+        <pc:picChg chg="add mod">
+          <ac:chgData name="David Starr" userId="6ddbe242-7791-472e-b298-418493ddd580" providerId="ADAL" clId="{1DD82897-10CD-4B31-9576-69908EC684FA}" dt="2023-01-11T21:23:15.008" v="293" actId="1076"/>
+          <ac:picMkLst>
+            <pc:docMk/>
+            <pc:sldMk cId="1836972722" sldId="257"/>
+            <ac:picMk id="1028" creationId="{EF3571A3-5AF0-D3FC-C505-C369D0C6AE11}"/>
+          </ac:picMkLst>
+        </pc:picChg>
+      </pc:sldChg>
+      <pc:sldChg chg="addSp delSp modSp mod modClrScheme chgLayout">
+        <pc:chgData name="David Starr" userId="6ddbe242-7791-472e-b298-418493ddd580" providerId="ADAL" clId="{1DD82897-10CD-4B31-9576-69908EC684FA}" dt="2023-01-11T21:24:35.129" v="309"/>
+        <pc:sldMkLst>
+          <pc:docMk/>
+          <pc:sldMk cId="775114203" sldId="258"/>
+        </pc:sldMkLst>
+        <pc:spChg chg="del mod ord">
+          <ac:chgData name="David Starr" userId="6ddbe242-7791-472e-b298-418493ddd580" providerId="ADAL" clId="{1DD82897-10CD-4B31-9576-69908EC684FA}" dt="2023-01-11T21:20:30.947" v="272" actId="700"/>
+          <ac:spMkLst>
+            <pc:docMk/>
+            <pc:sldMk cId="775114203" sldId="258"/>
+            <ac:spMk id="2" creationId="{8D0A5CD3-2FC0-F0CC-AE5C-71AA0207D437}"/>
+          </ac:spMkLst>
+        </pc:spChg>
+        <pc:spChg chg="add mod ord">
+          <ac:chgData name="David Starr" userId="6ddbe242-7791-472e-b298-418493ddd580" providerId="ADAL" clId="{1DD82897-10CD-4B31-9576-69908EC684FA}" dt="2023-01-11T21:20:46.352" v="274"/>
+          <ac:spMkLst>
+            <pc:docMk/>
+            <pc:sldMk cId="775114203" sldId="258"/>
+            <ac:spMk id="3" creationId="{D7625231-071A-7733-971A-C38A77CE5487}"/>
+          </ac:spMkLst>
+        </pc:spChg>
+        <pc:spChg chg="add mod ord">
+          <ac:chgData name="David Starr" userId="6ddbe242-7791-472e-b298-418493ddd580" providerId="ADAL" clId="{1DD82897-10CD-4B31-9576-69908EC684FA}" dt="2023-01-11T21:24:35.129" v="309"/>
+          <ac:spMkLst>
+            <pc:docMk/>
+            <pc:sldMk cId="775114203" sldId="258"/>
+            <ac:spMk id="4" creationId="{F522B629-756C-07F7-8BAC-A71B9125986C}"/>
+          </ac:spMkLst>
+        </pc:spChg>
+      </pc:sldChg>
+      <pc:sldChg chg="addSp delSp modSp mod modClrScheme chgLayout">
+        <pc:chgData name="David Starr" userId="6ddbe242-7791-472e-b298-418493ddd580" providerId="ADAL" clId="{1DD82897-10CD-4B31-9576-69908EC684FA}" dt="2023-01-11T21:25:43.696" v="359" actId="20577"/>
+        <pc:sldMkLst>
+          <pc:docMk/>
+          <pc:sldMk cId="1166457334" sldId="260"/>
+        </pc:sldMkLst>
+        <pc:spChg chg="del mod ord">
+          <ac:chgData name="David Starr" userId="6ddbe242-7791-472e-b298-418493ddd580" providerId="ADAL" clId="{1DD82897-10CD-4B31-9576-69908EC684FA}" dt="2023-01-11T21:20:30.947" v="272" actId="700"/>
+          <ac:spMkLst>
+            <pc:docMk/>
+            <pc:sldMk cId="1166457334" sldId="260"/>
+            <ac:spMk id="2" creationId="{3B4806F7-C92E-104C-93F4-3D047FC91C42}"/>
+          </ac:spMkLst>
+        </pc:spChg>
+        <pc:spChg chg="del mod ord">
+          <ac:chgData name="David Starr" userId="6ddbe242-7791-472e-b298-418493ddd580" providerId="ADAL" clId="{1DD82897-10CD-4B31-9576-69908EC684FA}" dt="2023-01-11T21:20:30.947" v="272" actId="700"/>
+          <ac:spMkLst>
+            <pc:docMk/>
+            <pc:sldMk cId="1166457334" sldId="260"/>
+            <ac:spMk id="3" creationId="{DE6E2452-11B7-FBB9-D8AB-D6C1B6A75894}"/>
+          </ac:spMkLst>
+        </pc:spChg>
+        <pc:spChg chg="del">
+          <ac:chgData name="David Starr" userId="6ddbe242-7791-472e-b298-418493ddd580" providerId="ADAL" clId="{1DD82897-10CD-4B31-9576-69908EC684FA}" dt="2023-01-11T21:20:30.947" v="272" actId="700"/>
+          <ac:spMkLst>
+            <pc:docMk/>
+            <pc:sldMk cId="1166457334" sldId="260"/>
+            <ac:spMk id="4" creationId="{C25E4751-DEB5-EDD2-1F8D-C31D0AD08327}"/>
+          </ac:spMkLst>
+        </pc:spChg>
+        <pc:spChg chg="del">
+          <ac:chgData name="David Starr" userId="6ddbe242-7791-472e-b298-418493ddd580" providerId="ADAL" clId="{1DD82897-10CD-4B31-9576-69908EC684FA}" dt="2023-01-11T21:20:30.947" v="272" actId="700"/>
+          <ac:spMkLst>
+            <pc:docMk/>
+            <pc:sldMk cId="1166457334" sldId="260"/>
+            <ac:spMk id="5" creationId="{F1A232AA-BCE3-6497-07CE-70A629CD9FD9}"/>
+          </ac:spMkLst>
+        </pc:spChg>
+        <pc:spChg chg="del">
+          <ac:chgData name="David Starr" userId="6ddbe242-7791-472e-b298-418493ddd580" providerId="ADAL" clId="{1DD82897-10CD-4B31-9576-69908EC684FA}" dt="2023-01-11T21:20:30.947" v="272" actId="700"/>
+          <ac:spMkLst>
+            <pc:docMk/>
+            <pc:sldMk cId="1166457334" sldId="260"/>
+            <ac:spMk id="6" creationId="{972E22D7-3EED-C938-9D92-1DE6ED158071}"/>
+          </ac:spMkLst>
+        </pc:spChg>
+        <pc:spChg chg="add mod ord">
+          <ac:chgData name="David Starr" userId="6ddbe242-7791-472e-b298-418493ddd580" providerId="ADAL" clId="{1DD82897-10CD-4B31-9576-69908EC684FA}" dt="2023-01-11T21:20:39.232" v="273"/>
+          <ac:spMkLst>
+            <pc:docMk/>
+            <pc:sldMk cId="1166457334" sldId="260"/>
+            <ac:spMk id="7" creationId="{999B89A5-7F43-4B85-8697-DBF12737551C}"/>
+          </ac:spMkLst>
+        </pc:spChg>
+        <pc:spChg chg="add mod ord">
+          <ac:chgData name="David Starr" userId="6ddbe242-7791-472e-b298-418493ddd580" providerId="ADAL" clId="{1DD82897-10CD-4B31-9576-69908EC684FA}" dt="2023-01-11T21:25:43.696" v="359" actId="20577"/>
+          <ac:spMkLst>
+            <pc:docMk/>
+            <pc:sldMk cId="1166457334" sldId="260"/>
+            <ac:spMk id="8" creationId="{4FC0B9FC-E646-B1CF-5DC3-D33BDA2BD38C}"/>
+          </ac:spMkLst>
+        </pc:spChg>
+      </pc:sldChg>
+      <pc:sldChg chg="modSp add mod">
+        <pc:chgData name="David Starr" userId="6ddbe242-7791-472e-b298-418493ddd580" providerId="ADAL" clId="{1DD82897-10CD-4B31-9576-69908EC684FA}" dt="2023-01-11T21:24:47.022" v="316"/>
+        <pc:sldMkLst>
+          <pc:docMk/>
+          <pc:sldMk cId="1073690450" sldId="261"/>
+        </pc:sldMkLst>
+        <pc:spChg chg="mod">
+          <ac:chgData name="David Starr" userId="6ddbe242-7791-472e-b298-418493ddd580" providerId="ADAL" clId="{1DD82897-10CD-4B31-9576-69908EC684FA}" dt="2023-01-11T21:20:56.749" v="278"/>
+          <ac:spMkLst>
+            <pc:docMk/>
+            <pc:sldMk cId="1073690450" sldId="261"/>
+            <ac:spMk id="3" creationId="{D7625231-071A-7733-971A-C38A77CE5487}"/>
+          </ac:spMkLst>
+        </pc:spChg>
+        <pc:spChg chg="mod">
+          <ac:chgData name="David Starr" userId="6ddbe242-7791-472e-b298-418493ddd580" providerId="ADAL" clId="{1DD82897-10CD-4B31-9576-69908EC684FA}" dt="2023-01-11T21:24:47.022" v="316"/>
+          <ac:spMkLst>
+            <pc:docMk/>
+            <pc:sldMk cId="1073690450" sldId="261"/>
+            <ac:spMk id="4" creationId="{F522B629-756C-07F7-8BAC-A71B9125986C}"/>
+          </ac:spMkLst>
+        </pc:spChg>
+      </pc:sldChg>
+      <pc:sldChg chg="modSp add mod">
+        <pc:chgData name="David Starr" userId="6ddbe242-7791-472e-b298-418493ddd580" providerId="ADAL" clId="{1DD82897-10CD-4B31-9576-69908EC684FA}" dt="2023-01-11T21:25:03.182" v="323"/>
+        <pc:sldMkLst>
+          <pc:docMk/>
+          <pc:sldMk cId="3191753558" sldId="262"/>
+        </pc:sldMkLst>
+        <pc:spChg chg="mod">
+          <ac:chgData name="David Starr" userId="6ddbe242-7791-472e-b298-418493ddd580" providerId="ADAL" clId="{1DD82897-10CD-4B31-9576-69908EC684FA}" dt="2023-01-11T21:21:07.952" v="279"/>
+          <ac:spMkLst>
+            <pc:docMk/>
+            <pc:sldMk cId="3191753558" sldId="262"/>
+            <ac:spMk id="3" creationId="{D7625231-071A-7733-971A-C38A77CE5487}"/>
+          </ac:spMkLst>
+        </pc:spChg>
+        <pc:spChg chg="mod">
+          <ac:chgData name="David Starr" userId="6ddbe242-7791-472e-b298-418493ddd580" providerId="ADAL" clId="{1DD82897-10CD-4B31-9576-69908EC684FA}" dt="2023-01-11T21:25:03.182" v="323"/>
+          <ac:spMkLst>
+            <pc:docMk/>
+            <pc:sldMk cId="3191753558" sldId="262"/>
+            <ac:spMk id="4" creationId="{F522B629-756C-07F7-8BAC-A71B9125986C}"/>
+          </ac:spMkLst>
+        </pc:spChg>
+      </pc:sldChg>
+      <pc:sldChg chg="modSp add mod ord">
+        <pc:chgData name="David Starr" userId="6ddbe242-7791-472e-b298-418493ddd580" providerId="ADAL" clId="{1DD82897-10CD-4B31-9576-69908EC684FA}" dt="2023-01-11T21:25:14.922" v="330"/>
+        <pc:sldMkLst>
+          <pc:docMk/>
+          <pc:sldMk cId="1592465994" sldId="263"/>
+        </pc:sldMkLst>
+        <pc:spChg chg="mod">
+          <ac:chgData name="David Starr" userId="6ddbe242-7791-472e-b298-418493ddd580" providerId="ADAL" clId="{1DD82897-10CD-4B31-9576-69908EC684FA}" dt="2023-01-11T21:21:20.632" v="282"/>
+          <ac:spMkLst>
+            <pc:docMk/>
+            <pc:sldMk cId="1592465994" sldId="263"/>
+            <ac:spMk id="3" creationId="{D7625231-071A-7733-971A-C38A77CE5487}"/>
+          </ac:spMkLst>
+        </pc:spChg>
+        <pc:spChg chg="mod">
+          <ac:chgData name="David Starr" userId="6ddbe242-7791-472e-b298-418493ddd580" providerId="ADAL" clId="{1DD82897-10CD-4B31-9576-69908EC684FA}" dt="2023-01-11T21:25:14.922" v="330"/>
+          <ac:spMkLst>
+            <pc:docMk/>
+            <pc:sldMk cId="1592465994" sldId="263"/>
+            <ac:spMk id="4" creationId="{F522B629-756C-07F7-8BAC-A71B9125986C}"/>
+          </ac:spMkLst>
+        </pc:spChg>
+      </pc:sldChg>
+    </pc:docChg>
+  </pc:docChgLst>
+  <pc:docChgLst>
     <pc:chgData name="Edward Chung" userId="4093b631-7edf-43e1-80e1-d99da0bb76da" providerId="ADAL" clId="{9C8E16FE-7CFD-4900-A0A5-0E224DB27208}"/>
     <pc:docChg chg="undo custSel addSld delSld modSld sldOrd modMainMaster">
       <pc:chgData name="Edward Chung" userId="4093b631-7edf-43e1-80e1-d99da0bb76da" providerId="ADAL" clId="{9C8E16FE-7CFD-4900-A0A5-0E224DB27208}" dt="2022-05-24T20:35:46.309" v="29" actId="47"/>
@@ -629,440 +1063,6 @@
               <pc:sldMasterMk cId="1881724970" sldId="2147484551"/>
               <pc:sldLayoutMk cId="934305822" sldId="2147484591"/>
               <ac:picMk id="3" creationId="{891518E4-4870-B238-6381-D5A780B4AC24}"/>
-            </ac:picMkLst>
-          </pc:picChg>
-        </pc:sldLayoutChg>
-      </pc:sldMasterChg>
-    </pc:docChg>
-  </pc:docChgLst>
-  <pc:docChgLst>
-    <pc:chgData name="David Starr" userId="6ddbe242-7791-472e-b298-418493ddd580" providerId="ADAL" clId="{1DD82897-10CD-4B31-9576-69908EC684FA}"/>
-    <pc:docChg chg="undo redo custSel addSld modSld sldOrd">
-      <pc:chgData name="David Starr" userId="6ddbe242-7791-472e-b298-418493ddd580" providerId="ADAL" clId="{1DD82897-10CD-4B31-9576-69908EC684FA}" dt="2023-01-11T21:25:43.696" v="359" actId="20577"/>
-      <pc:docMkLst>
-        <pc:docMk/>
-      </pc:docMkLst>
-      <pc:sldChg chg="modSp mod">
-        <pc:chgData name="David Starr" userId="6ddbe242-7791-472e-b298-418493ddd580" providerId="ADAL" clId="{1DD82897-10CD-4B31-9576-69908EC684FA}" dt="2023-01-11T19:42:11.803" v="72" actId="20577"/>
-        <pc:sldMkLst>
-          <pc:docMk/>
-          <pc:sldMk cId="2580197328" sldId="256"/>
-        </pc:sldMkLst>
-        <pc:spChg chg="mod">
-          <ac:chgData name="David Starr" userId="6ddbe242-7791-472e-b298-418493ddd580" providerId="ADAL" clId="{1DD82897-10CD-4B31-9576-69908EC684FA}" dt="2023-01-11T19:41:56.643" v="41" actId="20577"/>
-          <ac:spMkLst>
-            <pc:docMk/>
-            <pc:sldMk cId="2580197328" sldId="256"/>
-            <ac:spMk id="2" creationId="{DA5405D5-CF41-7457-4892-4D86FF283021}"/>
-          </ac:spMkLst>
-        </pc:spChg>
-        <pc:spChg chg="mod">
-          <ac:chgData name="David Starr" userId="6ddbe242-7791-472e-b298-418493ddd580" providerId="ADAL" clId="{1DD82897-10CD-4B31-9576-69908EC684FA}" dt="2023-01-11T19:42:11.803" v="72" actId="20577"/>
-          <ac:spMkLst>
-            <pc:docMk/>
-            <pc:sldMk cId="2580197328" sldId="256"/>
-            <ac:spMk id="3" creationId="{0800C02F-8D61-6517-31E4-D9126BB0981B}"/>
-          </ac:spMkLst>
-        </pc:spChg>
-      </pc:sldChg>
-      <pc:sldChg chg="addSp delSp modSp mod modClrScheme modAnim chgLayout">
-        <pc:chgData name="David Starr" userId="6ddbe242-7791-472e-b298-418493ddd580" providerId="ADAL" clId="{1DD82897-10CD-4B31-9576-69908EC684FA}" dt="2023-01-11T21:23:36.321" v="295" actId="1076"/>
-        <pc:sldMkLst>
-          <pc:docMk/>
-          <pc:sldMk cId="1836972722" sldId="257"/>
-        </pc:sldMkLst>
-        <pc:spChg chg="del mod ord">
-          <ac:chgData name="David Starr" userId="6ddbe242-7791-472e-b298-418493ddd580" providerId="ADAL" clId="{1DD82897-10CD-4B31-9576-69908EC684FA}" dt="2023-01-11T21:10:51.935" v="73" actId="700"/>
-          <ac:spMkLst>
-            <pc:docMk/>
-            <pc:sldMk cId="1836972722" sldId="257"/>
-            <ac:spMk id="2" creationId="{B0D68870-F9D5-4827-1E9F-6A80A7E5D219}"/>
-          </ac:spMkLst>
-        </pc:spChg>
-        <pc:spChg chg="del mod ord">
-          <ac:chgData name="David Starr" userId="6ddbe242-7791-472e-b298-418493ddd580" providerId="ADAL" clId="{1DD82897-10CD-4B31-9576-69908EC684FA}" dt="2023-01-11T21:10:51.935" v="73" actId="700"/>
-          <ac:spMkLst>
-            <pc:docMk/>
-            <pc:sldMk cId="1836972722" sldId="257"/>
-            <ac:spMk id="3" creationId="{13AD9785-CE58-C194-797B-40E60223A6B4}"/>
-          </ac:spMkLst>
-        </pc:spChg>
-        <pc:spChg chg="add mod ord">
-          <ac:chgData name="David Starr" userId="6ddbe242-7791-472e-b298-418493ddd580" providerId="ADAL" clId="{1DD82897-10CD-4B31-9576-69908EC684FA}" dt="2023-01-11T21:23:36.321" v="295" actId="1076"/>
-          <ac:spMkLst>
-            <pc:docMk/>
-            <pc:sldMk cId="1836972722" sldId="257"/>
-            <ac:spMk id="4" creationId="{146F4643-71A0-2321-FCE0-9CA534BA0075}"/>
-          </ac:spMkLst>
-        </pc:spChg>
-        <pc:spChg chg="add mod ord">
-          <ac:chgData name="David Starr" userId="6ddbe242-7791-472e-b298-418493ddd580" providerId="ADAL" clId="{1DD82897-10CD-4B31-9576-69908EC684FA}" dt="2023-01-11T21:23:36.321" v="295" actId="1076"/>
-          <ac:spMkLst>
-            <pc:docMk/>
-            <pc:sldMk cId="1836972722" sldId="257"/>
-            <ac:spMk id="5" creationId="{730A7CCF-3703-E73E-B6BA-811FE4ACF1FD}"/>
-          </ac:spMkLst>
-        </pc:spChg>
-        <pc:spChg chg="add del mod ord">
-          <ac:chgData name="David Starr" userId="6ddbe242-7791-472e-b298-418493ddd580" providerId="ADAL" clId="{1DD82897-10CD-4B31-9576-69908EC684FA}" dt="2023-01-11T21:16:58.034" v="242" actId="931"/>
-          <ac:spMkLst>
-            <pc:docMk/>
-            <pc:sldMk cId="1836972722" sldId="257"/>
-            <ac:spMk id="6" creationId="{497DAFDA-8DB3-3ED5-F667-B6C06C59F1D4}"/>
-          </ac:spMkLst>
-        </pc:spChg>
-        <pc:spChg chg="add mod">
-          <ac:chgData name="David Starr" userId="6ddbe242-7791-472e-b298-418493ddd580" providerId="ADAL" clId="{1DD82897-10CD-4B31-9576-69908EC684FA}" dt="2023-01-11T21:17:06.612" v="246" actId="14100"/>
-          <ac:spMkLst>
-            <pc:docMk/>
-            <pc:sldMk cId="1836972722" sldId="257"/>
-            <ac:spMk id="9" creationId="{4FB2E3F7-9519-38CF-3962-84663F133F61}"/>
-          </ac:spMkLst>
-        </pc:spChg>
-        <pc:spChg chg="add del">
-          <ac:chgData name="David Starr" userId="6ddbe242-7791-472e-b298-418493ddd580" providerId="ADAL" clId="{1DD82897-10CD-4B31-9576-69908EC684FA}" dt="2023-01-11T21:17:54.755" v="250" actId="478"/>
-          <ac:spMkLst>
-            <pc:docMk/>
-            <pc:sldMk cId="1836972722" sldId="257"/>
-            <ac:spMk id="11" creationId="{EA3594FA-BA35-674F-BD65-FFB8B97832E8}"/>
-          </ac:spMkLst>
-        </pc:spChg>
-        <pc:picChg chg="add mod ord">
-          <ac:chgData name="David Starr" userId="6ddbe242-7791-472e-b298-418493ddd580" providerId="ADAL" clId="{1DD82897-10CD-4B31-9576-69908EC684FA}" dt="2023-01-11T21:23:20.762" v="294" actId="1076"/>
-          <ac:picMkLst>
-            <pc:docMk/>
-            <pc:sldMk cId="1836972722" sldId="257"/>
-            <ac:picMk id="8" creationId="{1993F7BF-72E6-0CFD-E06D-3978DD1E28B6}"/>
-          </ac:picMkLst>
-        </pc:picChg>
-        <pc:picChg chg="add mod">
-          <ac:chgData name="David Starr" userId="6ddbe242-7791-472e-b298-418493ddd580" providerId="ADAL" clId="{1DD82897-10CD-4B31-9576-69908EC684FA}" dt="2023-01-11T21:23:05.846" v="291" actId="1076"/>
-          <ac:picMkLst>
-            <pc:docMk/>
-            <pc:sldMk cId="1836972722" sldId="257"/>
-            <ac:picMk id="1026" creationId="{ED7A942C-7B59-0789-817C-B34411368A90}"/>
-          </ac:picMkLst>
-        </pc:picChg>
-        <pc:picChg chg="add mod">
-          <ac:chgData name="David Starr" userId="6ddbe242-7791-472e-b298-418493ddd580" providerId="ADAL" clId="{1DD82897-10CD-4B31-9576-69908EC684FA}" dt="2023-01-11T21:23:15.008" v="293" actId="1076"/>
-          <ac:picMkLst>
-            <pc:docMk/>
-            <pc:sldMk cId="1836972722" sldId="257"/>
-            <ac:picMk id="1028" creationId="{EF3571A3-5AF0-D3FC-C505-C369D0C6AE11}"/>
-          </ac:picMkLst>
-        </pc:picChg>
-      </pc:sldChg>
-      <pc:sldChg chg="addSp delSp modSp mod modClrScheme chgLayout">
-        <pc:chgData name="David Starr" userId="6ddbe242-7791-472e-b298-418493ddd580" providerId="ADAL" clId="{1DD82897-10CD-4B31-9576-69908EC684FA}" dt="2023-01-11T21:24:35.129" v="309"/>
-        <pc:sldMkLst>
-          <pc:docMk/>
-          <pc:sldMk cId="775114203" sldId="258"/>
-        </pc:sldMkLst>
-        <pc:spChg chg="del mod ord">
-          <ac:chgData name="David Starr" userId="6ddbe242-7791-472e-b298-418493ddd580" providerId="ADAL" clId="{1DD82897-10CD-4B31-9576-69908EC684FA}" dt="2023-01-11T21:20:30.947" v="272" actId="700"/>
-          <ac:spMkLst>
-            <pc:docMk/>
-            <pc:sldMk cId="775114203" sldId="258"/>
-            <ac:spMk id="2" creationId="{8D0A5CD3-2FC0-F0CC-AE5C-71AA0207D437}"/>
-          </ac:spMkLst>
-        </pc:spChg>
-        <pc:spChg chg="add mod ord">
-          <ac:chgData name="David Starr" userId="6ddbe242-7791-472e-b298-418493ddd580" providerId="ADAL" clId="{1DD82897-10CD-4B31-9576-69908EC684FA}" dt="2023-01-11T21:20:46.352" v="274"/>
-          <ac:spMkLst>
-            <pc:docMk/>
-            <pc:sldMk cId="775114203" sldId="258"/>
-            <ac:spMk id="3" creationId="{D7625231-071A-7733-971A-C38A77CE5487}"/>
-          </ac:spMkLst>
-        </pc:spChg>
-        <pc:spChg chg="add mod ord">
-          <ac:chgData name="David Starr" userId="6ddbe242-7791-472e-b298-418493ddd580" providerId="ADAL" clId="{1DD82897-10CD-4B31-9576-69908EC684FA}" dt="2023-01-11T21:24:35.129" v="309"/>
-          <ac:spMkLst>
-            <pc:docMk/>
-            <pc:sldMk cId="775114203" sldId="258"/>
-            <ac:spMk id="4" creationId="{F522B629-756C-07F7-8BAC-A71B9125986C}"/>
-          </ac:spMkLst>
-        </pc:spChg>
-      </pc:sldChg>
-      <pc:sldChg chg="addSp delSp modSp mod modClrScheme chgLayout">
-        <pc:chgData name="David Starr" userId="6ddbe242-7791-472e-b298-418493ddd580" providerId="ADAL" clId="{1DD82897-10CD-4B31-9576-69908EC684FA}" dt="2023-01-11T21:25:43.696" v="359" actId="20577"/>
-        <pc:sldMkLst>
-          <pc:docMk/>
-          <pc:sldMk cId="1166457334" sldId="260"/>
-        </pc:sldMkLst>
-        <pc:spChg chg="del mod ord">
-          <ac:chgData name="David Starr" userId="6ddbe242-7791-472e-b298-418493ddd580" providerId="ADAL" clId="{1DD82897-10CD-4B31-9576-69908EC684FA}" dt="2023-01-11T21:20:30.947" v="272" actId="700"/>
-          <ac:spMkLst>
-            <pc:docMk/>
-            <pc:sldMk cId="1166457334" sldId="260"/>
-            <ac:spMk id="2" creationId="{3B4806F7-C92E-104C-93F4-3D047FC91C42}"/>
-          </ac:spMkLst>
-        </pc:spChg>
-        <pc:spChg chg="del mod ord">
-          <ac:chgData name="David Starr" userId="6ddbe242-7791-472e-b298-418493ddd580" providerId="ADAL" clId="{1DD82897-10CD-4B31-9576-69908EC684FA}" dt="2023-01-11T21:20:30.947" v="272" actId="700"/>
-          <ac:spMkLst>
-            <pc:docMk/>
-            <pc:sldMk cId="1166457334" sldId="260"/>
-            <ac:spMk id="3" creationId="{DE6E2452-11B7-FBB9-D8AB-D6C1B6A75894}"/>
-          </ac:spMkLst>
-        </pc:spChg>
-        <pc:spChg chg="del">
-          <ac:chgData name="David Starr" userId="6ddbe242-7791-472e-b298-418493ddd580" providerId="ADAL" clId="{1DD82897-10CD-4B31-9576-69908EC684FA}" dt="2023-01-11T21:20:30.947" v="272" actId="700"/>
-          <ac:spMkLst>
-            <pc:docMk/>
-            <pc:sldMk cId="1166457334" sldId="260"/>
-            <ac:spMk id="4" creationId="{C25E4751-DEB5-EDD2-1F8D-C31D0AD08327}"/>
-          </ac:spMkLst>
-        </pc:spChg>
-        <pc:spChg chg="del">
-          <ac:chgData name="David Starr" userId="6ddbe242-7791-472e-b298-418493ddd580" providerId="ADAL" clId="{1DD82897-10CD-4B31-9576-69908EC684FA}" dt="2023-01-11T21:20:30.947" v="272" actId="700"/>
-          <ac:spMkLst>
-            <pc:docMk/>
-            <pc:sldMk cId="1166457334" sldId="260"/>
-            <ac:spMk id="5" creationId="{F1A232AA-BCE3-6497-07CE-70A629CD9FD9}"/>
-          </ac:spMkLst>
-        </pc:spChg>
-        <pc:spChg chg="del">
-          <ac:chgData name="David Starr" userId="6ddbe242-7791-472e-b298-418493ddd580" providerId="ADAL" clId="{1DD82897-10CD-4B31-9576-69908EC684FA}" dt="2023-01-11T21:20:30.947" v="272" actId="700"/>
-          <ac:spMkLst>
-            <pc:docMk/>
-            <pc:sldMk cId="1166457334" sldId="260"/>
-            <ac:spMk id="6" creationId="{972E22D7-3EED-C938-9D92-1DE6ED158071}"/>
-          </ac:spMkLst>
-        </pc:spChg>
-        <pc:spChg chg="add mod ord">
-          <ac:chgData name="David Starr" userId="6ddbe242-7791-472e-b298-418493ddd580" providerId="ADAL" clId="{1DD82897-10CD-4B31-9576-69908EC684FA}" dt="2023-01-11T21:20:39.232" v="273"/>
-          <ac:spMkLst>
-            <pc:docMk/>
-            <pc:sldMk cId="1166457334" sldId="260"/>
-            <ac:spMk id="7" creationId="{999B89A5-7F43-4B85-8697-DBF12737551C}"/>
-          </ac:spMkLst>
-        </pc:spChg>
-        <pc:spChg chg="add mod ord">
-          <ac:chgData name="David Starr" userId="6ddbe242-7791-472e-b298-418493ddd580" providerId="ADAL" clId="{1DD82897-10CD-4B31-9576-69908EC684FA}" dt="2023-01-11T21:25:43.696" v="359" actId="20577"/>
-          <ac:spMkLst>
-            <pc:docMk/>
-            <pc:sldMk cId="1166457334" sldId="260"/>
-            <ac:spMk id="8" creationId="{4FC0B9FC-E646-B1CF-5DC3-D33BDA2BD38C}"/>
-          </ac:spMkLst>
-        </pc:spChg>
-      </pc:sldChg>
-      <pc:sldChg chg="modSp add mod">
-        <pc:chgData name="David Starr" userId="6ddbe242-7791-472e-b298-418493ddd580" providerId="ADAL" clId="{1DD82897-10CD-4B31-9576-69908EC684FA}" dt="2023-01-11T21:24:47.022" v="316"/>
-        <pc:sldMkLst>
-          <pc:docMk/>
-          <pc:sldMk cId="1073690450" sldId="261"/>
-        </pc:sldMkLst>
-        <pc:spChg chg="mod">
-          <ac:chgData name="David Starr" userId="6ddbe242-7791-472e-b298-418493ddd580" providerId="ADAL" clId="{1DD82897-10CD-4B31-9576-69908EC684FA}" dt="2023-01-11T21:20:56.749" v="278"/>
-          <ac:spMkLst>
-            <pc:docMk/>
-            <pc:sldMk cId="1073690450" sldId="261"/>
-            <ac:spMk id="3" creationId="{D7625231-071A-7733-971A-C38A77CE5487}"/>
-          </ac:spMkLst>
-        </pc:spChg>
-        <pc:spChg chg="mod">
-          <ac:chgData name="David Starr" userId="6ddbe242-7791-472e-b298-418493ddd580" providerId="ADAL" clId="{1DD82897-10CD-4B31-9576-69908EC684FA}" dt="2023-01-11T21:24:47.022" v="316"/>
-          <ac:spMkLst>
-            <pc:docMk/>
-            <pc:sldMk cId="1073690450" sldId="261"/>
-            <ac:spMk id="4" creationId="{F522B629-756C-07F7-8BAC-A71B9125986C}"/>
-          </ac:spMkLst>
-        </pc:spChg>
-      </pc:sldChg>
-      <pc:sldChg chg="modSp add mod">
-        <pc:chgData name="David Starr" userId="6ddbe242-7791-472e-b298-418493ddd580" providerId="ADAL" clId="{1DD82897-10CD-4B31-9576-69908EC684FA}" dt="2023-01-11T21:25:03.182" v="323"/>
-        <pc:sldMkLst>
-          <pc:docMk/>
-          <pc:sldMk cId="3191753558" sldId="262"/>
-        </pc:sldMkLst>
-        <pc:spChg chg="mod">
-          <ac:chgData name="David Starr" userId="6ddbe242-7791-472e-b298-418493ddd580" providerId="ADAL" clId="{1DD82897-10CD-4B31-9576-69908EC684FA}" dt="2023-01-11T21:21:07.952" v="279"/>
-          <ac:spMkLst>
-            <pc:docMk/>
-            <pc:sldMk cId="3191753558" sldId="262"/>
-            <ac:spMk id="3" creationId="{D7625231-071A-7733-971A-C38A77CE5487}"/>
-          </ac:spMkLst>
-        </pc:spChg>
-        <pc:spChg chg="mod">
-          <ac:chgData name="David Starr" userId="6ddbe242-7791-472e-b298-418493ddd580" providerId="ADAL" clId="{1DD82897-10CD-4B31-9576-69908EC684FA}" dt="2023-01-11T21:25:03.182" v="323"/>
-          <ac:spMkLst>
-            <pc:docMk/>
-            <pc:sldMk cId="3191753558" sldId="262"/>
-            <ac:spMk id="4" creationId="{F522B629-756C-07F7-8BAC-A71B9125986C}"/>
-          </ac:spMkLst>
-        </pc:spChg>
-      </pc:sldChg>
-      <pc:sldChg chg="modSp add mod ord">
-        <pc:chgData name="David Starr" userId="6ddbe242-7791-472e-b298-418493ddd580" providerId="ADAL" clId="{1DD82897-10CD-4B31-9576-69908EC684FA}" dt="2023-01-11T21:25:14.922" v="330"/>
-        <pc:sldMkLst>
-          <pc:docMk/>
-          <pc:sldMk cId="1592465994" sldId="263"/>
-        </pc:sldMkLst>
-        <pc:spChg chg="mod">
-          <ac:chgData name="David Starr" userId="6ddbe242-7791-472e-b298-418493ddd580" providerId="ADAL" clId="{1DD82897-10CD-4B31-9576-69908EC684FA}" dt="2023-01-11T21:21:20.632" v="282"/>
-          <ac:spMkLst>
-            <pc:docMk/>
-            <pc:sldMk cId="1592465994" sldId="263"/>
-            <ac:spMk id="3" creationId="{D7625231-071A-7733-971A-C38A77CE5487}"/>
-          </ac:spMkLst>
-        </pc:spChg>
-        <pc:spChg chg="mod">
-          <ac:chgData name="David Starr" userId="6ddbe242-7791-472e-b298-418493ddd580" providerId="ADAL" clId="{1DD82897-10CD-4B31-9576-69908EC684FA}" dt="2023-01-11T21:25:14.922" v="330"/>
-          <ac:spMkLst>
-            <pc:docMk/>
-            <pc:sldMk cId="1592465994" sldId="263"/>
-            <ac:spMk id="4" creationId="{F522B629-756C-07F7-8BAC-A71B9125986C}"/>
-          </ac:spMkLst>
-        </pc:spChg>
-      </pc:sldChg>
-    </pc:docChg>
-  </pc:docChgLst>
-  <pc:docChgLst>
-    <pc:chgData name="Peter Chen (he/him/his)" userId="b2ddb297-e149-4638-9e0d-b08ac0c0453d" providerId="ADAL" clId="{1A40F780-8006-42FA-9CE1-26CA9D2C83AA}"/>
-    <pc:docChg chg="modMainMaster">
-      <pc:chgData name="Peter Chen (he/him/his)" userId="b2ddb297-e149-4638-9e0d-b08ac0c0453d" providerId="ADAL" clId="{1A40F780-8006-42FA-9CE1-26CA9D2C83AA}" dt="2022-05-24T21:18:39.554" v="7" actId="22"/>
-      <pc:docMkLst>
-        <pc:docMk/>
-      </pc:docMkLst>
-      <pc:sldMasterChg chg="modSldLayout">
-        <pc:chgData name="Peter Chen (he/him/his)" userId="b2ddb297-e149-4638-9e0d-b08ac0c0453d" providerId="ADAL" clId="{1A40F780-8006-42FA-9CE1-26CA9D2C83AA}" dt="2022-05-24T21:18:39.554" v="7" actId="22"/>
-        <pc:sldMasterMkLst>
-          <pc:docMk/>
-          <pc:sldMasterMk cId="1881724970" sldId="2147484551"/>
-        </pc:sldMasterMkLst>
-        <pc:sldLayoutChg chg="addSp mod">
-          <pc:chgData name="Peter Chen (he/him/his)" userId="b2ddb297-e149-4638-9e0d-b08ac0c0453d" providerId="ADAL" clId="{1A40F780-8006-42FA-9CE1-26CA9D2C83AA}" dt="2022-05-24T21:18:39.554" v="7" actId="22"/>
-          <pc:sldLayoutMkLst>
-            <pc:docMk/>
-            <pc:sldMasterMk cId="1881724970" sldId="2147484551"/>
-            <pc:sldLayoutMk cId="3569326217" sldId="2147484568"/>
-          </pc:sldLayoutMkLst>
-          <pc:picChg chg="add">
-            <ac:chgData name="Peter Chen (he/him/his)" userId="b2ddb297-e149-4638-9e0d-b08ac0c0453d" providerId="ADAL" clId="{1A40F780-8006-42FA-9CE1-26CA9D2C83AA}" dt="2022-05-24T21:18:39.554" v="7" actId="22"/>
-            <ac:picMkLst>
-              <pc:docMk/>
-              <pc:sldMasterMk cId="1881724970" sldId="2147484551"/>
-              <pc:sldLayoutMk cId="3569326217" sldId="2147484568"/>
-              <ac:picMk id="3" creationId="{230F1609-C5AA-81F4-37E1-D6FA129E99A4}"/>
-            </ac:picMkLst>
-          </pc:picChg>
-        </pc:sldLayoutChg>
-        <pc:sldLayoutChg chg="addSp mod">
-          <pc:chgData name="Peter Chen (he/him/his)" userId="b2ddb297-e149-4638-9e0d-b08ac0c0453d" providerId="ADAL" clId="{1A40F780-8006-42FA-9CE1-26CA9D2C83AA}" dt="2022-05-24T21:18:20.115" v="0" actId="22"/>
-          <pc:sldLayoutMkLst>
-            <pc:docMk/>
-            <pc:sldMasterMk cId="1881724970" sldId="2147484551"/>
-            <pc:sldLayoutMk cId="3820680019" sldId="2147484586"/>
-          </pc:sldLayoutMkLst>
-          <pc:picChg chg="add">
-            <ac:chgData name="Peter Chen (he/him/his)" userId="b2ddb297-e149-4638-9e0d-b08ac0c0453d" providerId="ADAL" clId="{1A40F780-8006-42FA-9CE1-26CA9D2C83AA}" dt="2022-05-24T21:18:20.115" v="0" actId="22"/>
-            <ac:picMkLst>
-              <pc:docMk/>
-              <pc:sldMasterMk cId="1881724970" sldId="2147484551"/>
-              <pc:sldLayoutMk cId="3820680019" sldId="2147484586"/>
-              <ac:picMk id="2" creationId="{1061C88F-28CE-D606-8069-B66E7D3AB706}"/>
-            </ac:picMkLst>
-          </pc:picChg>
-        </pc:sldLayoutChg>
-        <pc:sldLayoutChg chg="addSp mod">
-          <pc:chgData name="Peter Chen (he/him/his)" userId="b2ddb297-e149-4638-9e0d-b08ac0c0453d" providerId="ADAL" clId="{1A40F780-8006-42FA-9CE1-26CA9D2C83AA}" dt="2022-05-24T21:18:26.555" v="1" actId="22"/>
-          <pc:sldLayoutMkLst>
-            <pc:docMk/>
-            <pc:sldMasterMk cId="1881724970" sldId="2147484551"/>
-            <pc:sldLayoutMk cId="83484138" sldId="2147484611"/>
-          </pc:sldLayoutMkLst>
-          <pc:picChg chg="add">
-            <ac:chgData name="Peter Chen (he/him/his)" userId="b2ddb297-e149-4638-9e0d-b08ac0c0453d" providerId="ADAL" clId="{1A40F780-8006-42FA-9CE1-26CA9D2C83AA}" dt="2022-05-24T21:18:26.555" v="1" actId="22"/>
-            <ac:picMkLst>
-              <pc:docMk/>
-              <pc:sldMasterMk cId="1881724970" sldId="2147484551"/>
-              <pc:sldLayoutMk cId="83484138" sldId="2147484611"/>
-              <ac:picMk id="4" creationId="{B815F539-844E-18E8-D33D-376A98B08D72}"/>
-            </ac:picMkLst>
-          </pc:picChg>
-        </pc:sldLayoutChg>
-        <pc:sldLayoutChg chg="addSp mod">
-          <pc:chgData name="Peter Chen (he/him/his)" userId="b2ddb297-e149-4638-9e0d-b08ac0c0453d" providerId="ADAL" clId="{1A40F780-8006-42FA-9CE1-26CA9D2C83AA}" dt="2022-05-24T21:18:29.236" v="2" actId="22"/>
-          <pc:sldLayoutMkLst>
-            <pc:docMk/>
-            <pc:sldMasterMk cId="1881724970" sldId="2147484551"/>
-            <pc:sldLayoutMk cId="1090860398" sldId="2147484612"/>
-          </pc:sldLayoutMkLst>
-          <pc:picChg chg="add">
-            <ac:chgData name="Peter Chen (he/him/his)" userId="b2ddb297-e149-4638-9e0d-b08ac0c0453d" providerId="ADAL" clId="{1A40F780-8006-42FA-9CE1-26CA9D2C83AA}" dt="2022-05-24T21:18:29.236" v="2" actId="22"/>
-            <ac:picMkLst>
-              <pc:docMk/>
-              <pc:sldMasterMk cId="1881724970" sldId="2147484551"/>
-              <pc:sldLayoutMk cId="1090860398" sldId="2147484612"/>
-              <ac:picMk id="3" creationId="{537D3E27-5C82-0B19-6B67-62EC116F2A6D}"/>
-            </ac:picMkLst>
-          </pc:picChg>
-        </pc:sldLayoutChg>
-        <pc:sldLayoutChg chg="addSp mod">
-          <pc:chgData name="Peter Chen (he/him/his)" userId="b2ddb297-e149-4638-9e0d-b08ac0c0453d" providerId="ADAL" clId="{1A40F780-8006-42FA-9CE1-26CA9D2C83AA}" dt="2022-05-24T21:18:35.900" v="5" actId="22"/>
-          <pc:sldLayoutMkLst>
-            <pc:docMk/>
-            <pc:sldMasterMk cId="1881724970" sldId="2147484551"/>
-            <pc:sldLayoutMk cId="3206052122" sldId="2147484613"/>
-          </pc:sldLayoutMkLst>
-          <pc:picChg chg="add">
-            <ac:chgData name="Peter Chen (he/him/his)" userId="b2ddb297-e149-4638-9e0d-b08ac0c0453d" providerId="ADAL" clId="{1A40F780-8006-42FA-9CE1-26CA9D2C83AA}" dt="2022-05-24T21:18:35.900" v="5" actId="22"/>
-            <ac:picMkLst>
-              <pc:docMk/>
-              <pc:sldMasterMk cId="1881724970" sldId="2147484551"/>
-              <pc:sldLayoutMk cId="3206052122" sldId="2147484613"/>
-              <ac:picMk id="3" creationId="{015F68C3-13B8-6115-8583-0A79BB69844E}"/>
-            </ac:picMkLst>
-          </pc:picChg>
-        </pc:sldLayoutChg>
-        <pc:sldLayoutChg chg="addSp mod">
-          <pc:chgData name="Peter Chen (he/him/his)" userId="b2ddb297-e149-4638-9e0d-b08ac0c0453d" providerId="ADAL" clId="{1A40F780-8006-42FA-9CE1-26CA9D2C83AA}" dt="2022-05-24T21:18:32.665" v="3" actId="22"/>
-          <pc:sldLayoutMkLst>
-            <pc:docMk/>
-            <pc:sldMasterMk cId="1881724970" sldId="2147484551"/>
-            <pc:sldLayoutMk cId="1951571362" sldId="2147484615"/>
-          </pc:sldLayoutMkLst>
-          <pc:picChg chg="add">
-            <ac:chgData name="Peter Chen (he/him/his)" userId="b2ddb297-e149-4638-9e0d-b08ac0c0453d" providerId="ADAL" clId="{1A40F780-8006-42FA-9CE1-26CA9D2C83AA}" dt="2022-05-24T21:18:32.665" v="3" actId="22"/>
-            <ac:picMkLst>
-              <pc:docMk/>
-              <pc:sldMasterMk cId="1881724970" sldId="2147484551"/>
-              <pc:sldLayoutMk cId="1951571362" sldId="2147484615"/>
-              <ac:picMk id="3" creationId="{11AFFDDB-D23A-DF33-7AC2-5627B1917C9B}"/>
-            </ac:picMkLst>
-          </pc:picChg>
-        </pc:sldLayoutChg>
-        <pc:sldLayoutChg chg="addSp mod">
-          <pc:chgData name="Peter Chen (he/him/his)" userId="b2ddb297-e149-4638-9e0d-b08ac0c0453d" providerId="ADAL" clId="{1A40F780-8006-42FA-9CE1-26CA9D2C83AA}" dt="2022-05-24T21:18:34.314" v="4" actId="22"/>
-          <pc:sldLayoutMkLst>
-            <pc:docMk/>
-            <pc:sldMasterMk cId="1881724970" sldId="2147484551"/>
-            <pc:sldLayoutMk cId="2992215150" sldId="2147484616"/>
-          </pc:sldLayoutMkLst>
-          <pc:picChg chg="add">
-            <ac:chgData name="Peter Chen (he/him/his)" userId="b2ddb297-e149-4638-9e0d-b08ac0c0453d" providerId="ADAL" clId="{1A40F780-8006-42FA-9CE1-26CA9D2C83AA}" dt="2022-05-24T21:18:34.314" v="4" actId="22"/>
-            <ac:picMkLst>
-              <pc:docMk/>
-              <pc:sldMasterMk cId="1881724970" sldId="2147484551"/>
-              <pc:sldLayoutMk cId="2992215150" sldId="2147484616"/>
-              <ac:picMk id="3" creationId="{BDEC1A94-B678-7B9C-2479-C8E4BB1477CC}"/>
-            </ac:picMkLst>
-          </pc:picChg>
-        </pc:sldLayoutChg>
-        <pc:sldLayoutChg chg="addSp mod">
-          <pc:chgData name="Peter Chen (he/him/his)" userId="b2ddb297-e149-4638-9e0d-b08ac0c0453d" providerId="ADAL" clId="{1A40F780-8006-42FA-9CE1-26CA9D2C83AA}" dt="2022-05-24T21:18:37.727" v="6" actId="22"/>
-          <pc:sldLayoutMkLst>
-            <pc:docMk/>
-            <pc:sldMasterMk cId="1881724970" sldId="2147484551"/>
-            <pc:sldLayoutMk cId="3954081687" sldId="2147484617"/>
-          </pc:sldLayoutMkLst>
-          <pc:picChg chg="add">
-            <ac:chgData name="Peter Chen (he/him/his)" userId="b2ddb297-e149-4638-9e0d-b08ac0c0453d" providerId="ADAL" clId="{1A40F780-8006-42FA-9CE1-26CA9D2C83AA}" dt="2022-05-24T21:18:37.727" v="6" actId="22"/>
-            <ac:picMkLst>
-              <pc:docMk/>
-              <pc:sldMasterMk cId="1881724970" sldId="2147484551"/>
-              <pc:sldLayoutMk cId="3954081687" sldId="2147484617"/>
-              <ac:picMk id="2" creationId="{FA153C55-4C0C-9EBB-3E8C-CE9B4158E029}"/>
             </ac:picMkLst>
           </pc:picChg>
         </pc:sldLayoutChg>
@@ -2444,7 +2444,7 @@
               <a:rPr lang="en-US" smtClean="0">
                 <a:latin typeface="Segoe UI" pitchFamily="34" charset="0"/>
               </a:rPr>
-              <a:t>1/11/2023 2:17 PM</a:t>
+              <a:t>1/12/2023 8:27 AM</a:t>
             </a:fld>
             <a:endParaRPr lang="en-US">
               <a:latin typeface="Segoe UI" pitchFamily="34" charset="0"/>
@@ -2722,7 +2722,7 @@
           <a:p>
             <a:fld id="{DCE60099-03E7-4FA1-8A7F-E6E6CFB0F855}" type="datetime8">
               <a:rPr lang="en-US" smtClean="0"/>
-              <a:t>1/11/2023 1:41 PM</a:t>
+              <a:t>1/12/2023 8:06 AM</a:t>
             </a:fld>
             <a:endParaRPr lang="en-US"/>
           </a:p>
@@ -7650,7 +7650,7 @@
     <p:bg>
       <p:bgPr>
         <a:solidFill>
-          <a:srgbClr val="92D050"/>
+          <a:schemeClr val="tx2"/>
         </a:solidFill>
         <a:effectLst/>
       </p:bgPr>
@@ -7691,7 +7691,11 @@
           <a:lstStyle/>
           <a:p>
             <a:r>
-              <a:rPr lang="en-US" dirty="0"/>
+              <a:rPr lang="en-US" dirty="0">
+                <a:solidFill>
+                  <a:schemeClr val="bg1"/>
+                </a:solidFill>
+              </a:rPr>
               <a:t>Single Responsibility Principle</a:t>
             </a:r>
           </a:p>
@@ -7725,7 +7729,11 @@
           <a:p>
             <a:pPr algn="ctr"/>
             <a:r>
-              <a:rPr lang="en-US" sz="4000" dirty="0"/>
+              <a:rPr lang="en-US" sz="4000" dirty="0">
+                <a:solidFill>
+                  <a:schemeClr val="bg1"/>
+                </a:solidFill>
+              </a:rPr>
               <a:t>A class should do one thing and therefore have one, and only one, reason to change.</a:t>
             </a:r>
           </a:p>
@@ -7750,99 +7758,10 @@
 <file path=ppt/slides/slide4.xml><?xml version="1.0" encoding="utf-8"?>
 <p:sld xmlns:a="http://schemas.openxmlformats.org/drawingml/2006/main" xmlns:r="http://schemas.openxmlformats.org/officeDocument/2006/relationships" xmlns:p="http://schemas.openxmlformats.org/presentationml/2006/main">
   <p:cSld>
-    <p:spTree>
-      <p:nvGrpSpPr>
-        <p:cNvPr id="1" name=""/>
-        <p:cNvGrpSpPr/>
-        <p:nvPr/>
-      </p:nvGrpSpPr>
-      <p:grpSpPr>
-        <a:xfrm>
-          <a:off x="0" y="0"/>
-          <a:ext cx="0" cy="0"/>
-          <a:chOff x="0" y="0"/>
-          <a:chExt cx="0" cy="0"/>
-        </a:xfrm>
-      </p:grpSpPr>
-      <p:sp>
-        <p:nvSpPr>
-          <p:cNvPr id="7" name="Title 6">
-            <a:extLst>
-              <a:ext uri="{FF2B5EF4-FFF2-40B4-BE49-F238E27FC236}">
-                <a16:creationId xmlns:a16="http://schemas.microsoft.com/office/drawing/2014/main" id="{999B89A5-7F43-4B85-8697-DBF12737551C}"/>
-              </a:ext>
-            </a:extLst>
-          </p:cNvPr>
-          <p:cNvSpPr>
-            <a:spLocks noGrp="1"/>
-          </p:cNvSpPr>
-          <p:nvPr>
-            <p:ph type="title"/>
-          </p:nvPr>
-        </p:nvSpPr>
-        <p:spPr/>
-        <p:txBody>
-          <a:bodyPr/>
-          <a:lstStyle/>
-          <a:p>
-            <a:r>
-              <a:rPr lang="en-US" dirty="0"/>
-              <a:t>Single Responsibility Principle</a:t>
-            </a:r>
-          </a:p>
-        </p:txBody>
-      </p:sp>
-      <p:sp>
-        <p:nvSpPr>
-          <p:cNvPr id="8" name="Content Placeholder 7">
-            <a:extLst>
-              <a:ext uri="{FF2B5EF4-FFF2-40B4-BE49-F238E27FC236}">
-                <a16:creationId xmlns:a16="http://schemas.microsoft.com/office/drawing/2014/main" id="{4FC0B9FC-E646-B1CF-5DC3-D33BDA2BD38C}"/>
-              </a:ext>
-            </a:extLst>
-          </p:cNvPr>
-          <p:cNvSpPr>
-            <a:spLocks noGrp="1"/>
-          </p:cNvSpPr>
-          <p:nvPr>
-            <p:ph sz="quarter" idx="10"/>
-          </p:nvPr>
-        </p:nvSpPr>
-        <p:spPr/>
-        <p:txBody>
-          <a:bodyPr/>
-          <a:lstStyle/>
-          <a:p>
-            <a:r>
-              <a:rPr lang="en-US" dirty="0"/>
-              <a:t>A class should do one thing and therefore have one, and only one, reason to change.</a:t>
-            </a:r>
-          </a:p>
-        </p:txBody>
-      </p:sp>
-    </p:spTree>
-    <p:extLst>
-      <p:ext uri="{BB962C8B-B14F-4D97-AF65-F5344CB8AC3E}">
-        <p14:creationId xmlns:p14="http://schemas.microsoft.com/office/powerpoint/2010/main" val="413180437"/>
-      </p:ext>
-    </p:extLst>
-  </p:cSld>
-  <p:clrMapOvr>
-    <a:masterClrMapping/>
-  </p:clrMapOvr>
-  <p:transition>
-    <p:fade/>
-  </p:transition>
-</p:sld>
-</file>
-
-<file path=ppt/slides/slide5.xml><?xml version="1.0" encoding="utf-8"?>
-<p:sld xmlns:a="http://schemas.openxmlformats.org/drawingml/2006/main" xmlns:r="http://schemas.openxmlformats.org/officeDocument/2006/relationships" xmlns:p="http://schemas.openxmlformats.org/presentationml/2006/main">
-  <p:cSld>
     <p:bg>
       <p:bgPr>
         <a:solidFill>
-          <a:srgbClr val="92D050"/>
+          <a:schemeClr val="tx2"/>
         </a:solidFill>
         <a:effectLst/>
       </p:bgPr>
@@ -7883,7 +7802,11 @@
           <a:lstStyle/>
           <a:p>
             <a:r>
-              <a:rPr lang="en-US" dirty="0"/>
+              <a:rPr lang="en-US" dirty="0">
+                <a:solidFill>
+                  <a:schemeClr val="bg1"/>
+                </a:solidFill>
+              </a:rPr>
               <a:t>Open Close Principle</a:t>
             </a:r>
           </a:p>
@@ -7917,7 +7840,11 @@
           <a:p>
             <a:pPr algn="ctr"/>
             <a:r>
-              <a:rPr lang="en-US" sz="4000" dirty="0"/>
+              <a:rPr lang="en-US" sz="4000" dirty="0">
+                <a:solidFill>
+                  <a:schemeClr val="bg1"/>
+                </a:solidFill>
+              </a:rPr>
               <a:t>A class should be open for extension but closed for modification.</a:t>
             </a:r>
           </a:p>
@@ -7939,13 +7866,13 @@
 </p:sld>
 </file>
 
-<file path=ppt/slides/slide6.xml><?xml version="1.0" encoding="utf-8"?>
+<file path=ppt/slides/slide5.xml><?xml version="1.0" encoding="utf-8"?>
 <p:sld xmlns:a="http://schemas.openxmlformats.org/drawingml/2006/main" xmlns:r="http://schemas.openxmlformats.org/officeDocument/2006/relationships" xmlns:p="http://schemas.openxmlformats.org/presentationml/2006/main">
   <p:cSld>
     <p:bg>
       <p:bgPr>
         <a:solidFill>
-          <a:srgbClr val="92D050"/>
+          <a:schemeClr val="tx2"/>
         </a:solidFill>
         <a:effectLst/>
       </p:bgPr>
@@ -7986,11 +7913,19 @@
           <a:lstStyle/>
           <a:p>
             <a:r>
-              <a:rPr lang="en-US" dirty="0" err="1"/>
+              <a:rPr lang="en-US" dirty="0" err="1">
+                <a:solidFill>
+                  <a:schemeClr val="bg1"/>
+                </a:solidFill>
+              </a:rPr>
               <a:t>Liskov</a:t>
             </a:r>
             <a:r>
-              <a:rPr lang="en-US" dirty="0"/>
+              <a:rPr lang="en-US" dirty="0">
+                <a:solidFill>
+                  <a:schemeClr val="bg1"/>
+                </a:solidFill>
+              </a:rPr>
               <a:t> Substitution Principle</a:t>
             </a:r>
           </a:p>
@@ -8024,7 +7959,11 @@
           <a:p>
             <a:pPr algn="ctr"/>
             <a:r>
-              <a:rPr lang="en-US" sz="4000" dirty="0"/>
+              <a:rPr lang="en-US" sz="4000" dirty="0">
+                <a:solidFill>
+                  <a:schemeClr val="bg1"/>
+                </a:solidFill>
+              </a:rPr>
               <a:t>Derived classes must be substitutable for their base classes.</a:t>
             </a:r>
           </a:p>
@@ -8046,13 +7985,236 @@
 </p:sld>
 </file>
 
+<file path=ppt/slides/slide6.xml><?xml version="1.0" encoding="utf-8"?>
+<p:sld xmlns:a="http://schemas.openxmlformats.org/drawingml/2006/main" xmlns:r="http://schemas.openxmlformats.org/officeDocument/2006/relationships" xmlns:p="http://schemas.openxmlformats.org/presentationml/2006/main">
+  <p:cSld>
+    <p:spTree>
+      <p:nvGrpSpPr>
+        <p:cNvPr id="1" name=""/>
+        <p:cNvGrpSpPr/>
+        <p:nvPr/>
+      </p:nvGrpSpPr>
+      <p:grpSpPr>
+        <a:xfrm>
+          <a:off x="0" y="0"/>
+          <a:ext cx="0" cy="0"/>
+          <a:chOff x="0" y="0"/>
+          <a:chExt cx="0" cy="0"/>
+        </a:xfrm>
+      </p:grpSpPr>
+      <p:sp>
+        <p:nvSpPr>
+          <p:cNvPr id="2" name="Title 1">
+            <a:extLst>
+              <a:ext uri="{FF2B5EF4-FFF2-40B4-BE49-F238E27FC236}">
+                <a16:creationId xmlns:a16="http://schemas.microsoft.com/office/drawing/2014/main" id="{15A1A768-CEB2-9240-23A7-27EFE96BDC7A}"/>
+              </a:ext>
+            </a:extLst>
+          </p:cNvPr>
+          <p:cNvSpPr>
+            <a:spLocks noGrp="1"/>
+          </p:cNvSpPr>
+          <p:nvPr>
+            <p:ph type="title"/>
+          </p:nvPr>
+        </p:nvSpPr>
+        <p:spPr/>
+        <p:txBody>
+          <a:bodyPr/>
+          <a:lstStyle/>
+          <a:p>
+            <a:r>
+              <a:rPr lang="en-US" dirty="0" err="1"/>
+              <a:t>Liskov</a:t>
+            </a:r>
+            <a:r>
+              <a:rPr lang="en-US" dirty="0"/>
+              <a:t> Substitution Principle</a:t>
+            </a:r>
+          </a:p>
+        </p:txBody>
+      </p:sp>
+      <p:sp>
+        <p:nvSpPr>
+          <p:cNvPr id="3" name="Content Placeholder 2">
+            <a:extLst>
+              <a:ext uri="{FF2B5EF4-FFF2-40B4-BE49-F238E27FC236}">
+                <a16:creationId xmlns:a16="http://schemas.microsoft.com/office/drawing/2014/main" id="{A7CACEAB-9415-4C71-961C-BF7DFCF212E4}"/>
+              </a:ext>
+            </a:extLst>
+          </p:cNvPr>
+          <p:cNvSpPr>
+            <a:spLocks noGrp="1"/>
+          </p:cNvSpPr>
+          <p:nvPr>
+            <p:ph sz="quarter" idx="10"/>
+          </p:nvPr>
+        </p:nvSpPr>
+        <p:spPr>
+          <a:xfrm>
+            <a:off x="465138" y="1084263"/>
+            <a:ext cx="11530584" cy="923330"/>
+          </a:xfrm>
+        </p:spPr>
+        <p:txBody>
+          <a:bodyPr/>
+          <a:lstStyle/>
+          <a:p>
+            <a:r>
+              <a:rPr lang="en-US" dirty="0"/>
+              <a:t>This principle is closely related to the SRP and the OCP, as it helps to ensure that the classes are cohesive and that the program is extensible and maintainable.</a:t>
+            </a:r>
+          </a:p>
+        </p:txBody>
+      </p:sp>
+      <p:sp>
+        <p:nvSpPr>
+          <p:cNvPr id="7" name="TextBox 6">
+            <a:extLst>
+              <a:ext uri="{FF2B5EF4-FFF2-40B4-BE49-F238E27FC236}">
+                <a16:creationId xmlns:a16="http://schemas.microsoft.com/office/drawing/2014/main" id="{19C642F2-6653-E5A7-B7B0-9F5BB8137D9F}"/>
+              </a:ext>
+            </a:extLst>
+          </p:cNvPr>
+          <p:cNvSpPr txBox="1"/>
+          <p:nvPr/>
+        </p:nvSpPr>
+        <p:spPr>
+          <a:xfrm>
+            <a:off x="465138" y="2343101"/>
+            <a:ext cx="7095722" cy="3477875"/>
+          </a:xfrm>
+          <a:prstGeom prst="rect">
+            <a:avLst/>
+          </a:prstGeom>
+          <a:noFill/>
+        </p:spPr>
+        <p:txBody>
+          <a:bodyPr wrap="square">
+            <a:spAutoFit/>
+          </a:bodyPr>
+          <a:lstStyle/>
+          <a:p>
+            <a:r>
+              <a:rPr lang="en-US" sz="2000" dirty="0"/>
+              <a:t>Barbara </a:t>
+            </a:r>
+            <a:r>
+              <a:rPr lang="en-US" sz="2000" dirty="0" err="1"/>
+              <a:t>Liskov</a:t>
+            </a:r>
+            <a:r>
+              <a:rPr lang="en-US" sz="2000" dirty="0"/>
+              <a:t> is an American computer scientist and Turing Award winner known for her work on programming language design and the development of the </a:t>
+            </a:r>
+            <a:r>
+              <a:rPr lang="en-US" sz="2000" dirty="0" err="1"/>
+              <a:t>Liskov</a:t>
+            </a:r>
+            <a:r>
+              <a:rPr lang="en-US" sz="2000" dirty="0"/>
+              <a:t> Substitution Principle, a concept in object-oriented programming. </a:t>
+            </a:r>
+          </a:p>
+          <a:p>
+            <a:endParaRPr lang="en-US" sz="2000" dirty="0"/>
+          </a:p>
+          <a:p>
+            <a:r>
+              <a:rPr lang="en-US" sz="2000" dirty="0"/>
+              <a:t>She is an Institute Professor at the Massachusetts Institute of Technology (MIT) and a founding member of the computer science department at MIT. </a:t>
+            </a:r>
+          </a:p>
+          <a:p>
+            <a:endParaRPr lang="en-US" sz="2000" dirty="0"/>
+          </a:p>
+          <a:p>
+            <a:r>
+              <a:rPr lang="en-US" sz="2000" dirty="0"/>
+              <a:t>She was awarded the Turing award for her influential work on programming languages.</a:t>
+            </a:r>
+          </a:p>
+        </p:txBody>
+      </p:sp>
+      <p:pic>
+        <p:nvPicPr>
+          <p:cNvPr id="1026" name="Picture 2" descr="Liskov named to National Inventors Hall of Fame | MIT News | Massachusetts Institute of Technology">
+            <a:extLst>
+              <a:ext uri="{FF2B5EF4-FFF2-40B4-BE49-F238E27FC236}">
+                <a16:creationId xmlns:a16="http://schemas.microsoft.com/office/drawing/2014/main" id="{2C1FA73C-624E-2DDC-D75E-12DBD09D120A}"/>
+              </a:ext>
+            </a:extLst>
+          </p:cNvPr>
+          <p:cNvPicPr>
+            <a:picLocks noChangeAspect="1" noChangeArrowheads="1"/>
+          </p:cNvPicPr>
+          <p:nvPr/>
+        </p:nvPicPr>
+        <p:blipFill>
+          <a:blip r:embed="rId2">
+            <a:extLst>
+              <a:ext uri="{28A0092B-C50C-407E-A947-70E740481C1C}">
+                <a14:useLocalDpi xmlns:a14="http://schemas.microsoft.com/office/drawing/2010/main" val="0"/>
+              </a:ext>
+            </a:extLst>
+          </a:blip>
+          <a:srcRect/>
+          <a:stretch>
+            <a:fillRect/>
+          </a:stretch>
+        </p:blipFill>
+        <p:spPr bwMode="auto">
+          <a:xfrm>
+            <a:off x="7997588" y="2343101"/>
+            <a:ext cx="3998134" cy="3998134"/>
+          </a:xfrm>
+          <a:prstGeom prst="rect">
+            <a:avLst/>
+          </a:prstGeom>
+          <a:ln>
+            <a:noFill/>
+          </a:ln>
+          <a:effectLst>
+            <a:outerShdw blurRad="190500" algn="tl" rotWithShape="0">
+              <a:srgbClr val="000000">
+                <a:alpha val="70000"/>
+              </a:srgbClr>
+            </a:outerShdw>
+          </a:effectLst>
+          <a:extLst>
+            <a:ext uri="{909E8E84-426E-40DD-AFC4-6F175D3DCCD1}">
+              <a14:hiddenFill xmlns:a14="http://schemas.microsoft.com/office/drawing/2010/main">
+                <a:solidFill>
+                  <a:srgbClr val="FFFFFF"/>
+                </a:solidFill>
+              </a14:hiddenFill>
+            </a:ext>
+          </a:extLst>
+        </p:spPr>
+      </p:pic>
+    </p:spTree>
+    <p:extLst>
+      <p:ext uri="{BB962C8B-B14F-4D97-AF65-F5344CB8AC3E}">
+        <p14:creationId xmlns:p14="http://schemas.microsoft.com/office/powerpoint/2010/main" val="3095855542"/>
+      </p:ext>
+    </p:extLst>
+  </p:cSld>
+  <p:clrMapOvr>
+    <a:masterClrMapping/>
+  </p:clrMapOvr>
+  <p:transition>
+    <p:fade/>
+  </p:transition>
+</p:sld>
+</file>
+
 <file path=ppt/slides/slide7.xml><?xml version="1.0" encoding="utf-8"?>
 <p:sld xmlns:a="http://schemas.openxmlformats.org/drawingml/2006/main" xmlns:r="http://schemas.openxmlformats.org/officeDocument/2006/relationships" xmlns:p="http://schemas.openxmlformats.org/presentationml/2006/main">
   <p:cSld>
     <p:bg>
       <p:bgPr>
         <a:solidFill>
-          <a:srgbClr val="92D050"/>
+          <a:schemeClr val="tx2"/>
         </a:solidFill>
         <a:effectLst/>
       </p:bgPr>
@@ -8093,7 +8255,11 @@
           <a:lstStyle/>
           <a:p>
             <a:r>
-              <a:rPr lang="en-US" dirty="0"/>
+              <a:rPr lang="en-US" dirty="0">
+                <a:solidFill>
+                  <a:schemeClr val="bg1"/>
+                </a:solidFill>
+              </a:rPr>
               <a:t>Interface Segregation Principle</a:t>
             </a:r>
           </a:p>
@@ -8127,7 +8293,11 @@
           <a:p>
             <a:pPr algn="ctr"/>
             <a:r>
-              <a:rPr lang="en-US" sz="4000" dirty="0"/>
+              <a:rPr lang="en-US" sz="4000" dirty="0">
+                <a:solidFill>
+                  <a:schemeClr val="bg1"/>
+                </a:solidFill>
+              </a:rPr>
               <a:t>A class should not be forced to implement interfaces it does not use.</a:t>
             </a:r>
           </a:p>
@@ -8155,7 +8325,7 @@
     <p:bg>
       <p:bgPr>
         <a:solidFill>
-          <a:srgbClr val="92D050"/>
+          <a:schemeClr val="tx2"/>
         </a:solidFill>
         <a:effectLst/>
       </p:bgPr>
@@ -8196,7 +8366,11 @@
           <a:lstStyle/>
           <a:p>
             <a:r>
-              <a:rPr lang="en-US" dirty="0"/>
+              <a:rPr lang="en-US" dirty="0">
+                <a:solidFill>
+                  <a:schemeClr val="bg1"/>
+                </a:solidFill>
+              </a:rPr>
               <a:t>Dependency Inversion Principle</a:t>
             </a:r>
           </a:p>
@@ -8230,7 +8404,11 @@
           <a:p>
             <a:pPr algn="ctr"/>
             <a:r>
-              <a:rPr lang="en-US" sz="4000" dirty="0"/>
+              <a:rPr lang="en-US" sz="4000" dirty="0">
+                <a:solidFill>
+                  <a:schemeClr val="bg1"/>
+                </a:solidFill>
+              </a:rPr>
               <a:t>High-level modules should not depend on low-level modules; both should depend on abstractions.</a:t>
             </a:r>
           </a:p>
@@ -9490,6 +9668,30 @@
 </file>
 
 <file path=customXml/item1.xml><?xml version="1.0" encoding="utf-8"?>
+<p:properties xmlns:p="http://schemas.microsoft.com/office/2006/metadata/properties" xmlns:xsi="http://www.w3.org/2001/XMLSchema-instance" xmlns:pc="http://schemas.microsoft.com/office/infopath/2007/PartnerControls">
+  <documentManagement>
+    <_ip_UnifiedCompliancePolicyUIAction xmlns="http://schemas.microsoft.com/sharepoint/v3" xsi:nil="true"/>
+    <_ip_UnifiedCompliancePolicyProperties xmlns="http://schemas.microsoft.com/sharepoint/v3" xsi:nil="true"/>
+    <_Flow_SignoffStatus xmlns="860950fd-76a6-4866-9ca1-bf4d1f6059ce" xsi:nil="true"/>
+    <MediaServiceKeyPoints xmlns="860950fd-76a6-4866-9ca1-bf4d1f6059ce" xsi:nil="true"/>
+    <lcf76f155ced4ddcb4097134ff3c332f xmlns="860950fd-76a6-4866-9ca1-bf4d1f6059ce">
+      <Terms xmlns="http://schemas.microsoft.com/office/infopath/2007/PartnerControls"/>
+    </lcf76f155ced4ddcb4097134ff3c332f>
+    <TaxCatchAll xmlns="230e9df3-be65-4c73-a93b-d1236ebd677e" xsi:nil="true"/>
+  </documentManagement>
+</p:properties>
+</file>
+
+<file path=customXml/item2.xml><?xml version="1.0" encoding="utf-8"?>
+<?mso-contentType ?>
+<FormTemplates xmlns="http://schemas.microsoft.com/sharepoint/v3/contenttype/forms">
+  <Display>DocumentLibraryForm</Display>
+  <Edit>DocumentLibraryForm</Edit>
+  <New>DocumentLibraryForm</New>
+</FormTemplates>
+</file>
+
+<file path=customXml/item3.xml><?xml version="1.0" encoding="utf-8"?>
 <ct:contentTypeSchema xmlns:ct="http://schemas.microsoft.com/office/2006/metadata/contentType" xmlns:ma="http://schemas.microsoft.com/office/2006/metadata/properties/metaAttributes" ct:_="" ma:_="" ma:contentTypeName="Document" ma:contentTypeID="0x0101006D12764DAFF74E4B86583686E43A1815" ma:contentTypeVersion="26" ma:contentTypeDescription="Create a new document." ma:contentTypeScope="" ma:versionID="ca85cf6e2a9d5b1d4cf9fe1c5d9b48a8">
   <xsd:schema xmlns:xsd="http://www.w3.org/2001/XMLSchema" xmlns:xs="http://www.w3.org/2001/XMLSchema" xmlns:p="http://schemas.microsoft.com/office/2006/metadata/properties" xmlns:ns1="http://schemas.microsoft.com/sharepoint/v3" xmlns:ns2="860950fd-76a6-4866-9ca1-bf4d1f6059ce" xmlns:ns3="6a2d0f50-fb12-4f73-8097-036b3e2f6409" xmlns:ns4="230e9df3-be65-4c73-a93b-d1236ebd677e" targetNamespace="http://schemas.microsoft.com/office/2006/metadata/properties" ma:root="true" ma:fieldsID="46407f9d09d4b633adc6e457153fdd3a" ns1:_="" ns2:_="" ns3:_="" ns4:_="">
     <xsd:import namespace="http://schemas.microsoft.com/sharepoint/v3"/>
@@ -9784,31 +9986,34 @@
 </ct:contentTypeSchema>
 </file>
 
-<file path=customXml/item2.xml><?xml version="1.0" encoding="utf-8"?>
-<?mso-contentType ?>
-<FormTemplates xmlns="http://schemas.microsoft.com/sharepoint/v3/contenttype/forms">
-  <Display>DocumentLibraryForm</Display>
-  <Edit>DocumentLibraryForm</Edit>
-  <New>DocumentLibraryForm</New>
-</FormTemplates>
+<file path=customXml/itemProps1.xml><?xml version="1.0" encoding="utf-8"?>
+<ds:datastoreItem xmlns:ds="http://schemas.openxmlformats.org/officeDocument/2006/customXml" ds:itemID="{F990F116-B58F-4255-B05B-DA3808E0E5C6}">
+  <ds:schemaRefs>
+    <ds:schemaRef ds:uri="http://schemas.microsoft.com/office/infopath/2007/PartnerControls"/>
+    <ds:schemaRef ds:uri="http://schemas.microsoft.com/office/2006/metadata/properties"/>
+    <ds:schemaRef ds:uri="http://schemas.microsoft.com/sharepoint/v3"/>
+    <ds:schemaRef ds:uri="b7826971-e3ea-4cad-bc9a-2c6767373aaf"/>
+    <ds:schemaRef ds:uri="http://purl.org/dc/dcmitype/"/>
+    <ds:schemaRef ds:uri="http://schemas.microsoft.com/office/2006/documentManagement/types"/>
+    <ds:schemaRef ds:uri="http://schemas.openxmlformats.org/package/2006/metadata/core-properties"/>
+    <ds:schemaRef ds:uri="http://www.w3.org/XML/1998/namespace"/>
+    <ds:schemaRef ds:uri="http://purl.org/dc/terms/"/>
+    <ds:schemaRef ds:uri="http://purl.org/dc/elements/1.1/"/>
+    <ds:schemaRef ds:uri="860950fd-76a6-4866-9ca1-bf4d1f6059ce"/>
+    <ds:schemaRef ds:uri="230e9df3-be65-4c73-a93b-d1236ebd677e"/>
+  </ds:schemaRefs>
+</ds:datastoreItem>
 </file>
 
-<file path=customXml/item3.xml><?xml version="1.0" encoding="utf-8"?>
-<p:properties xmlns:p="http://schemas.microsoft.com/office/2006/metadata/properties" xmlns:xsi="http://www.w3.org/2001/XMLSchema-instance" xmlns:pc="http://schemas.microsoft.com/office/infopath/2007/PartnerControls">
-  <documentManagement>
-    <_ip_UnifiedCompliancePolicyUIAction xmlns="http://schemas.microsoft.com/sharepoint/v3" xsi:nil="true"/>
-    <_ip_UnifiedCompliancePolicyProperties xmlns="http://schemas.microsoft.com/sharepoint/v3" xsi:nil="true"/>
-    <_Flow_SignoffStatus xmlns="860950fd-76a6-4866-9ca1-bf4d1f6059ce" xsi:nil="true"/>
-    <MediaServiceKeyPoints xmlns="860950fd-76a6-4866-9ca1-bf4d1f6059ce" xsi:nil="true"/>
-    <lcf76f155ced4ddcb4097134ff3c332f xmlns="860950fd-76a6-4866-9ca1-bf4d1f6059ce">
-      <Terms xmlns="http://schemas.microsoft.com/office/infopath/2007/PartnerControls"/>
-    </lcf76f155ced4ddcb4097134ff3c332f>
-    <TaxCatchAll xmlns="230e9df3-be65-4c73-a93b-d1236ebd677e" xsi:nil="true"/>
-  </documentManagement>
-</p:properties>
+<file path=customXml/itemProps2.xml><?xml version="1.0" encoding="utf-8"?>
+<ds:datastoreItem xmlns:ds="http://schemas.openxmlformats.org/officeDocument/2006/customXml" ds:itemID="{758FDAC0-319D-4A54-8D8E-1D42CB1F8004}">
+  <ds:schemaRefs>
+    <ds:schemaRef ds:uri="http://schemas.microsoft.com/sharepoint/v3/contenttype/forms"/>
+  </ds:schemaRefs>
+</ds:datastoreItem>
 </file>
 
-<file path=customXml/itemProps1.xml><?xml version="1.0" encoding="utf-8"?>
+<file path=customXml/itemProps3.xml><?xml version="1.0" encoding="utf-8"?>
 <ds:datastoreItem xmlns:ds="http://schemas.openxmlformats.org/officeDocument/2006/customXml" ds:itemID="{36772250-7213-4E2E-AE95-8A7BEE3539AF}">
   <ds:schemaRefs>
     <ds:schemaRef ds:uri="http://schemas.microsoft.com/office/2006/metadata/contentType"/>
@@ -9829,33 +10034,6 @@
 </ds:datastoreItem>
 </file>
 
-<file path=customXml/itemProps2.xml><?xml version="1.0" encoding="utf-8"?>
-<ds:datastoreItem xmlns:ds="http://schemas.openxmlformats.org/officeDocument/2006/customXml" ds:itemID="{758FDAC0-319D-4A54-8D8E-1D42CB1F8004}">
-  <ds:schemaRefs>
-    <ds:schemaRef ds:uri="http://schemas.microsoft.com/sharepoint/v3/contenttype/forms"/>
-  </ds:schemaRefs>
-</ds:datastoreItem>
-</file>
-
-<file path=customXml/itemProps3.xml><?xml version="1.0" encoding="utf-8"?>
-<ds:datastoreItem xmlns:ds="http://schemas.openxmlformats.org/officeDocument/2006/customXml" ds:itemID="{F990F116-B58F-4255-B05B-DA3808E0E5C6}">
-  <ds:schemaRefs>
-    <ds:schemaRef ds:uri="http://schemas.microsoft.com/office/infopath/2007/PartnerControls"/>
-    <ds:schemaRef ds:uri="http://schemas.microsoft.com/office/2006/metadata/properties"/>
-    <ds:schemaRef ds:uri="http://schemas.microsoft.com/sharepoint/v3"/>
-    <ds:schemaRef ds:uri="b7826971-e3ea-4cad-bc9a-2c6767373aaf"/>
-    <ds:schemaRef ds:uri="http://purl.org/dc/dcmitype/"/>
-    <ds:schemaRef ds:uri="http://schemas.microsoft.com/office/2006/documentManagement/types"/>
-    <ds:schemaRef ds:uri="http://schemas.openxmlformats.org/package/2006/metadata/core-properties"/>
-    <ds:schemaRef ds:uri="http://www.w3.org/XML/1998/namespace"/>
-    <ds:schemaRef ds:uri="http://purl.org/dc/terms/"/>
-    <ds:schemaRef ds:uri="http://purl.org/dc/elements/1.1/"/>
-    <ds:schemaRef ds:uri="860950fd-76a6-4866-9ca1-bf4d1f6059ce"/>
-    <ds:schemaRef ds:uri="230e9df3-be65-4c73-a93b-d1236ebd677e"/>
-  </ds:schemaRefs>
-</ds:datastoreItem>
-</file>
-
 <file path=docMetadata/LabelInfo.xml><?xml version="1.0" encoding="utf-8"?>
 <clbl:labelList xmlns:clbl="http://schemas.microsoft.com/office/2020/mipLabelMetadata">
   <clbl:label id="{f42aa342-8706-4288-bd11-ebb85995028c}" enabled="1" method="Standard" siteId="{72f988bf-86f1-41af-91ab-2d7cd011db47}" contentBits="0" removed="0"/>

</xml_diff>